<commit_message>
added 3 things to da excel sheet
</commit_message>
<xml_diff>
--- a/Documents/CDR/CDR_Presentation.pptx
+++ b/Documents/CDR/CDR_Presentation.pptx
@@ -279,7 +279,7 @@
           <a:p>
             <a:fld id="{A749A21A-B890-4700-B57E-1CFFBFCC9631}" type="datetimeFigureOut">
               <a:rPr lang="en-US" smtClean="0"/>
-              <a:t>27-Sep-24</a:t>
+              <a:t>03-Oct-24</a:t>
             </a:fld>
             <a:endParaRPr lang="en-US"/>
           </a:p>
@@ -477,7 +477,7 @@
           <a:p>
             <a:fld id="{A749A21A-B890-4700-B57E-1CFFBFCC9631}" type="datetimeFigureOut">
               <a:rPr lang="en-US" smtClean="0"/>
-              <a:t>27-Sep-24</a:t>
+              <a:t>03-Oct-24</a:t>
             </a:fld>
             <a:endParaRPr lang="en-US"/>
           </a:p>
@@ -685,7 +685,7 @@
           <a:p>
             <a:fld id="{A749A21A-B890-4700-B57E-1CFFBFCC9631}" type="datetimeFigureOut">
               <a:rPr lang="en-US" smtClean="0"/>
-              <a:t>27-Sep-24</a:t>
+              <a:t>03-Oct-24</a:t>
             </a:fld>
             <a:endParaRPr lang="en-US"/>
           </a:p>
@@ -883,7 +883,7 @@
           <a:p>
             <a:fld id="{A749A21A-B890-4700-B57E-1CFFBFCC9631}" type="datetimeFigureOut">
               <a:rPr lang="en-US" smtClean="0"/>
-              <a:t>27-Sep-24</a:t>
+              <a:t>03-Oct-24</a:t>
             </a:fld>
             <a:endParaRPr lang="en-US"/>
           </a:p>
@@ -1158,7 +1158,7 @@
           <a:p>
             <a:fld id="{A749A21A-B890-4700-B57E-1CFFBFCC9631}" type="datetimeFigureOut">
               <a:rPr lang="en-US" smtClean="0"/>
-              <a:t>27-Sep-24</a:t>
+              <a:t>03-Oct-24</a:t>
             </a:fld>
             <a:endParaRPr lang="en-US"/>
           </a:p>
@@ -1423,7 +1423,7 @@
           <a:p>
             <a:fld id="{A749A21A-B890-4700-B57E-1CFFBFCC9631}" type="datetimeFigureOut">
               <a:rPr lang="en-US" smtClean="0"/>
-              <a:t>27-Sep-24</a:t>
+              <a:t>03-Oct-24</a:t>
             </a:fld>
             <a:endParaRPr lang="en-US"/>
           </a:p>
@@ -1835,7 +1835,7 @@
           <a:p>
             <a:fld id="{A749A21A-B890-4700-B57E-1CFFBFCC9631}" type="datetimeFigureOut">
               <a:rPr lang="en-US" smtClean="0"/>
-              <a:t>27-Sep-24</a:t>
+              <a:t>03-Oct-24</a:t>
             </a:fld>
             <a:endParaRPr lang="en-US"/>
           </a:p>
@@ -1976,7 +1976,7 @@
           <a:p>
             <a:fld id="{A749A21A-B890-4700-B57E-1CFFBFCC9631}" type="datetimeFigureOut">
               <a:rPr lang="en-US" smtClean="0"/>
-              <a:t>27-Sep-24</a:t>
+              <a:t>03-Oct-24</a:t>
             </a:fld>
             <a:endParaRPr lang="en-US"/>
           </a:p>
@@ -2089,7 +2089,7 @@
           <a:p>
             <a:fld id="{A749A21A-B890-4700-B57E-1CFFBFCC9631}" type="datetimeFigureOut">
               <a:rPr lang="en-US" smtClean="0"/>
-              <a:t>27-Sep-24</a:t>
+              <a:t>03-Oct-24</a:t>
             </a:fld>
             <a:endParaRPr lang="en-US"/>
           </a:p>
@@ -2400,7 +2400,7 @@
           <a:p>
             <a:fld id="{A749A21A-B890-4700-B57E-1CFFBFCC9631}" type="datetimeFigureOut">
               <a:rPr lang="en-US" smtClean="0"/>
-              <a:t>27-Sep-24</a:t>
+              <a:t>03-Oct-24</a:t>
             </a:fld>
             <a:endParaRPr lang="en-US"/>
           </a:p>
@@ -2688,7 +2688,7 @@
           <a:p>
             <a:fld id="{A749A21A-B890-4700-B57E-1CFFBFCC9631}" type="datetimeFigureOut">
               <a:rPr lang="en-US" smtClean="0"/>
-              <a:t>27-Sep-24</a:t>
+              <a:t>03-Oct-24</a:t>
             </a:fld>
             <a:endParaRPr lang="en-US"/>
           </a:p>
@@ -2929,7 +2929,7 @@
           <a:p>
             <a:fld id="{A749A21A-B890-4700-B57E-1CFFBFCC9631}" type="datetimeFigureOut">
               <a:rPr lang="en-US" smtClean="0"/>
-              <a:t>27-Sep-24</a:t>
+              <a:t>03-Oct-24</a:t>
             </a:fld>
             <a:endParaRPr lang="en-US"/>
           </a:p>
@@ -3500,7 +3500,7 @@
             </a:pPr>
             <a:r>
               <a:rPr lang="en-US" sz="2000" dirty="0"/>
-              <a:t>Tannyr Singleterry (L)(EE)</a:t>
+              <a:t>Tannyr Singleterry (L)(CMPEN)</a:t>
             </a:r>
           </a:p>
           <a:p>
@@ -3520,7 +3520,7 @@
             </a:pPr>
             <a:r>
               <a:rPr lang="en-US" sz="2000" dirty="0"/>
-              <a:t>Ethan Benne (CMPEN)</a:t>
+              <a:t>Ethan Benne (EE)</a:t>
             </a:r>
           </a:p>
           <a:p>
@@ -5307,7 +5307,7 @@
           <a:p>
             <a:r>
               <a:rPr lang="en-US" dirty="0"/>
-              <a:t>Design Concept 3</a:t>
+              <a:t>Microcontroller Options</a:t>
             </a:r>
           </a:p>
         </p:txBody>
@@ -5990,20 +5990,20 @@
 </file>
 
 <file path=customXml/item1.xml><?xml version="1.0" encoding="utf-8"?>
-<p:properties xmlns:p="http://schemas.microsoft.com/office/2006/metadata/properties" xmlns:xsi="http://www.w3.org/2001/XMLSchema-instance" xmlns:pc="http://schemas.microsoft.com/office/infopath/2007/PartnerControls">
-  <documentManagement>
-    <_activity xmlns="218cae68-0ddc-43bb-9a29-52a0402d6cb9" xsi:nil="true"/>
-  </documentManagement>
-</p:properties>
-</file>
-
-<file path=customXml/item2.xml><?xml version="1.0" encoding="utf-8"?>
 <?mso-contentType ?>
 <FormTemplates xmlns="http://schemas.microsoft.com/sharepoint/v3/contenttype/forms">
   <Display>DocumentLibraryForm</Display>
   <Edit>DocumentLibraryForm</Edit>
   <New>DocumentLibraryForm</New>
 </FormTemplates>
+</file>
+
+<file path=customXml/item2.xml><?xml version="1.0" encoding="utf-8"?>
+<p:properties xmlns:p="http://schemas.microsoft.com/office/2006/metadata/properties" xmlns:xsi="http://www.w3.org/2001/XMLSchema-instance" xmlns:pc="http://schemas.microsoft.com/office/infopath/2007/PartnerControls">
+  <documentManagement>
+    <_activity xmlns="218cae68-0ddc-43bb-9a29-52a0402d6cb9" xsi:nil="true"/>
+  </documentManagement>
+</p:properties>
 </file>
 
 <file path=customXml/item3.xml><?xml version="1.0" encoding="utf-8"?>
@@ -6240,6 +6240,14 @@
 </file>
 
 <file path=customXml/itemProps1.xml><?xml version="1.0" encoding="utf-8"?>
+<ds:datastoreItem xmlns:ds="http://schemas.openxmlformats.org/officeDocument/2006/customXml" ds:itemID="{3A69843A-82BD-41BC-9CFD-7A6BCBCF50D4}">
+  <ds:schemaRefs>
+    <ds:schemaRef ds:uri="http://schemas.microsoft.com/sharepoint/v3/contenttype/forms"/>
+  </ds:schemaRefs>
+</ds:datastoreItem>
+</file>
+
+<file path=customXml/itemProps2.xml><?xml version="1.0" encoding="utf-8"?>
 <ds:datastoreItem xmlns:ds="http://schemas.openxmlformats.org/officeDocument/2006/customXml" ds:itemID="{B218F515-3D1B-44A5-8439-DF0479902099}">
   <ds:schemaRefs>
     <ds:schemaRef ds:uri="http://purl.org/dc/dcmitype/"/>
@@ -6252,14 +6260,6 @@
     <ds:schemaRef ds:uri="703aeb73-56ce-48f3-9277-f60cff690132"/>
     <ds:schemaRef ds:uri="http://schemas.microsoft.com/office/2006/metadata/properties"/>
     <ds:schemaRef ds:uri="http://purl.org/dc/elements/1.1/"/>
-  </ds:schemaRefs>
-</ds:datastoreItem>
-</file>
-
-<file path=customXml/itemProps2.xml><?xml version="1.0" encoding="utf-8"?>
-<ds:datastoreItem xmlns:ds="http://schemas.openxmlformats.org/officeDocument/2006/customXml" ds:itemID="{3A69843A-82BD-41BC-9CFD-7A6BCBCF50D4}">
-  <ds:schemaRefs>
-    <ds:schemaRef ds:uri="http://schemas.microsoft.com/sharepoint/v3/contenttype/forms"/>
   </ds:schemaRefs>
 </ds:datastoreItem>
 </file>

</xml_diff>

<commit_message>
CDR Tables done yay
</commit_message>
<xml_diff>
--- a/Documents/CDR/CDR_Presentation.pptx
+++ b/Documents/CDR/CDR_Presentation.pptx
@@ -7,17 +7,19 @@
   <p:sldIdLst>
     <p:sldId id="256" r:id="rId5"/>
     <p:sldId id="263" r:id="rId6"/>
-    <p:sldId id="262" r:id="rId7"/>
-    <p:sldId id="261" r:id="rId8"/>
-    <p:sldId id="265" r:id="rId9"/>
-    <p:sldId id="264" r:id="rId10"/>
-    <p:sldId id="260" r:id="rId11"/>
-    <p:sldId id="259" r:id="rId12"/>
-    <p:sldId id="266" r:id="rId13"/>
-    <p:sldId id="257" r:id="rId14"/>
-    <p:sldId id="267" r:id="rId15"/>
-    <p:sldId id="258" r:id="rId16"/>
-    <p:sldId id="268" r:id="rId17"/>
+    <p:sldId id="269" r:id="rId7"/>
+    <p:sldId id="262" r:id="rId8"/>
+    <p:sldId id="261" r:id="rId9"/>
+    <p:sldId id="265" r:id="rId10"/>
+    <p:sldId id="264" r:id="rId11"/>
+    <p:sldId id="260" r:id="rId12"/>
+    <p:sldId id="270" r:id="rId13"/>
+    <p:sldId id="259" r:id="rId14"/>
+    <p:sldId id="266" r:id="rId15"/>
+    <p:sldId id="257" r:id="rId16"/>
+    <p:sldId id="267" r:id="rId17"/>
+    <p:sldId id="271" r:id="rId18"/>
+    <p:sldId id="268" r:id="rId19"/>
   </p:sldIdLst>
   <p:sldSz cx="12192000" cy="6858000"/>
   <p:notesSz cx="6858000" cy="9144000"/>
@@ -279,7 +281,7 @@
           <a:p>
             <a:fld id="{A749A21A-B890-4700-B57E-1CFFBFCC9631}" type="datetimeFigureOut">
               <a:rPr lang="en-US" smtClean="0"/>
-              <a:t>03-Oct-24</a:t>
+              <a:t>10/3/2024</a:t>
             </a:fld>
             <a:endParaRPr lang="en-US"/>
           </a:p>
@@ -477,7 +479,7 @@
           <a:p>
             <a:fld id="{A749A21A-B890-4700-B57E-1CFFBFCC9631}" type="datetimeFigureOut">
               <a:rPr lang="en-US" smtClean="0"/>
-              <a:t>03-Oct-24</a:t>
+              <a:t>10/3/2024</a:t>
             </a:fld>
             <a:endParaRPr lang="en-US"/>
           </a:p>
@@ -685,7 +687,7 @@
           <a:p>
             <a:fld id="{A749A21A-B890-4700-B57E-1CFFBFCC9631}" type="datetimeFigureOut">
               <a:rPr lang="en-US" smtClean="0"/>
-              <a:t>03-Oct-24</a:t>
+              <a:t>10/3/2024</a:t>
             </a:fld>
             <a:endParaRPr lang="en-US"/>
           </a:p>
@@ -883,7 +885,7 @@
           <a:p>
             <a:fld id="{A749A21A-B890-4700-B57E-1CFFBFCC9631}" type="datetimeFigureOut">
               <a:rPr lang="en-US" smtClean="0"/>
-              <a:t>03-Oct-24</a:t>
+              <a:t>10/3/2024</a:t>
             </a:fld>
             <a:endParaRPr lang="en-US"/>
           </a:p>
@@ -1158,7 +1160,7 @@
           <a:p>
             <a:fld id="{A749A21A-B890-4700-B57E-1CFFBFCC9631}" type="datetimeFigureOut">
               <a:rPr lang="en-US" smtClean="0"/>
-              <a:t>03-Oct-24</a:t>
+              <a:t>10/3/2024</a:t>
             </a:fld>
             <a:endParaRPr lang="en-US"/>
           </a:p>
@@ -1423,7 +1425,7 @@
           <a:p>
             <a:fld id="{A749A21A-B890-4700-B57E-1CFFBFCC9631}" type="datetimeFigureOut">
               <a:rPr lang="en-US" smtClean="0"/>
-              <a:t>03-Oct-24</a:t>
+              <a:t>10/3/2024</a:t>
             </a:fld>
             <a:endParaRPr lang="en-US"/>
           </a:p>
@@ -1835,7 +1837,7 @@
           <a:p>
             <a:fld id="{A749A21A-B890-4700-B57E-1CFFBFCC9631}" type="datetimeFigureOut">
               <a:rPr lang="en-US" smtClean="0"/>
-              <a:t>03-Oct-24</a:t>
+              <a:t>10/3/2024</a:t>
             </a:fld>
             <a:endParaRPr lang="en-US"/>
           </a:p>
@@ -1976,7 +1978,7 @@
           <a:p>
             <a:fld id="{A749A21A-B890-4700-B57E-1CFFBFCC9631}" type="datetimeFigureOut">
               <a:rPr lang="en-US" smtClean="0"/>
-              <a:t>03-Oct-24</a:t>
+              <a:t>10/3/2024</a:t>
             </a:fld>
             <a:endParaRPr lang="en-US"/>
           </a:p>
@@ -2089,7 +2091,7 @@
           <a:p>
             <a:fld id="{A749A21A-B890-4700-B57E-1CFFBFCC9631}" type="datetimeFigureOut">
               <a:rPr lang="en-US" smtClean="0"/>
-              <a:t>03-Oct-24</a:t>
+              <a:t>10/3/2024</a:t>
             </a:fld>
             <a:endParaRPr lang="en-US"/>
           </a:p>
@@ -2400,7 +2402,7 @@
           <a:p>
             <a:fld id="{A749A21A-B890-4700-B57E-1CFFBFCC9631}" type="datetimeFigureOut">
               <a:rPr lang="en-US" smtClean="0"/>
-              <a:t>03-Oct-24</a:t>
+              <a:t>10/3/2024</a:t>
             </a:fld>
             <a:endParaRPr lang="en-US"/>
           </a:p>
@@ -2688,7 +2690,7 @@
           <a:p>
             <a:fld id="{A749A21A-B890-4700-B57E-1CFFBFCC9631}" type="datetimeFigureOut">
               <a:rPr lang="en-US" smtClean="0"/>
-              <a:t>03-Oct-24</a:t>
+              <a:t>10/3/2024</a:t>
             </a:fld>
             <a:endParaRPr lang="en-US"/>
           </a:p>
@@ -2929,7 +2931,7 @@
           <a:p>
             <a:fld id="{A749A21A-B890-4700-B57E-1CFFBFCC9631}" type="datetimeFigureOut">
               <a:rPr lang="en-US" smtClean="0"/>
-              <a:t>03-Oct-24</a:t>
+              <a:t>10/3/2024</a:t>
             </a:fld>
             <a:endParaRPr lang="en-US"/>
           </a:p>
@@ -4000,7 +4002,7 @@
           <p:cNvPr id="2" name="Title 1">
             <a:extLst>
               <a:ext uri="{FF2B5EF4-FFF2-40B4-BE49-F238E27FC236}">
-                <a16:creationId xmlns:a16="http://schemas.microsoft.com/office/drawing/2014/main" id="{B67A333E-5C75-96D2-6959-292C687D5673}"/>
+                <a16:creationId xmlns:a16="http://schemas.microsoft.com/office/drawing/2014/main" id="{D4D58CD2-045B-1678-36BB-865E2FF7028A}"/>
               </a:ext>
             </a:extLst>
           </p:cNvPr>
@@ -4018,7 +4020,7 @@
           <a:p>
             <a:r>
               <a:rPr lang="en-US" dirty="0"/>
-              <a:t>Verification Plan</a:t>
+              <a:t>Block Diagram</a:t>
             </a:r>
           </a:p>
         </p:txBody>
@@ -4028,7 +4030,7 @@
           <p:cNvPr id="3" name="Content Placeholder 2">
             <a:extLst>
               <a:ext uri="{FF2B5EF4-FFF2-40B4-BE49-F238E27FC236}">
-                <a16:creationId xmlns:a16="http://schemas.microsoft.com/office/drawing/2014/main" id="{0FF5FD38-A45D-7408-58B5-6DAAD75B63BB}"/>
+                <a16:creationId xmlns:a16="http://schemas.microsoft.com/office/drawing/2014/main" id="{382034F8-C186-6B44-10C4-98CA9EB9D596}"/>
               </a:ext>
             </a:extLst>
           </p:cNvPr>
@@ -4044,18 +4046,92 @@
           <a:bodyPr/>
           <a:lstStyle/>
           <a:p>
-            <a:endParaRPr lang="en-US" b="1" dirty="0">
-              <a:solidFill>
-                <a:srgbClr val="7030A0"/>
-              </a:solidFill>
-            </a:endParaRPr>
-          </a:p>
-        </p:txBody>
-      </p:sp>
+            <a:r>
+              <a:rPr lang="en-US" dirty="0">
+                <a:solidFill>
+                  <a:schemeClr val="accent5">
+                    <a:lumMod val="75000"/>
+                  </a:schemeClr>
+                </a:solidFill>
+              </a:rPr>
+              <a:t>We need a block diagram c:</a:t>
+            </a:r>
+          </a:p>
+        </p:txBody>
+      </p:sp>
+      <p:graphicFrame>
+        <p:nvGraphicFramePr>
+          <p:cNvPr id="12" name="Object 11">
+            <a:extLst>
+              <a:ext uri="{FF2B5EF4-FFF2-40B4-BE49-F238E27FC236}">
+                <a16:creationId xmlns:a16="http://schemas.microsoft.com/office/drawing/2014/main" id="{166FE0A4-4D8B-C501-D415-931635258017}"/>
+              </a:ext>
+            </a:extLst>
+          </p:cNvPr>
+          <p:cNvGraphicFramePr>
+            <a:graphicFrameLocks noChangeAspect="1"/>
+          </p:cNvGraphicFramePr>
+          <p:nvPr>
+            <p:extLst>
+              <p:ext uri="{D42A27DB-BD31-4B8C-83A1-F6EECF244321}">
+                <p14:modId xmlns:p14="http://schemas.microsoft.com/office/powerpoint/2010/main" val="40233665"/>
+              </p:ext>
+            </p:extLst>
+          </p:nvPr>
+        </p:nvGraphicFramePr>
+        <p:xfrm>
+          <a:off x="6627353" y="221456"/>
+          <a:ext cx="4533900" cy="6415087"/>
+        </p:xfrm>
+        <a:graphic>
+          <a:graphicData uri="http://schemas.openxmlformats.org/presentationml/2006/ole">
+            <mc:AlternateContent xmlns:mc="http://schemas.openxmlformats.org/markup-compatibility/2006">
+              <mc:Choice xmlns:v="urn:schemas-microsoft-com:vml" Requires="v">
+                <p:oleObj name="Acrobat Document" r:id="rId2" imgW="4533723" imgH="6415677" progId="Acrobat.Document.DC">
+                  <p:embed/>
+                </p:oleObj>
+              </mc:Choice>
+              <mc:Fallback>
+                <p:oleObj name="Acrobat Document" r:id="rId2" imgW="4533723" imgH="6415677" progId="Acrobat.Document.DC">
+                  <p:embed/>
+                  <p:pic>
+                    <p:nvPicPr>
+                      <p:cNvPr id="12" name="Object 11">
+                        <a:extLst>
+                          <a:ext uri="{FF2B5EF4-FFF2-40B4-BE49-F238E27FC236}">
+                            <a16:creationId xmlns:a16="http://schemas.microsoft.com/office/drawing/2014/main" id="{166FE0A4-4D8B-C501-D415-931635258017}"/>
+                          </a:ext>
+                        </a:extLst>
+                      </p:cNvPr>
+                      <p:cNvPicPr/>
+                      <p:nvPr/>
+                    </p:nvPicPr>
+                    <p:blipFill>
+                      <a:blip r:embed="rId3"/>
+                      <a:stretch>
+                        <a:fillRect/>
+                      </a:stretch>
+                    </p:blipFill>
+                    <p:spPr>
+                      <a:xfrm>
+                        <a:off x="6627353" y="221456"/>
+                        <a:ext cx="4533900" cy="6415087"/>
+                      </a:xfrm>
+                      <a:prstGeom prst="rect">
+                        <a:avLst/>
+                      </a:prstGeom>
+                    </p:spPr>
+                  </p:pic>
+                </p:oleObj>
+              </mc:Fallback>
+            </mc:AlternateContent>
+          </a:graphicData>
+        </a:graphic>
+      </p:graphicFrame>
     </p:spTree>
     <p:extLst>
       <p:ext uri="{BB962C8B-B14F-4D97-AF65-F5344CB8AC3E}">
-        <p14:creationId xmlns:p14="http://schemas.microsoft.com/office/powerpoint/2010/main" val="982414475"/>
+        <p14:creationId xmlns:p14="http://schemas.microsoft.com/office/powerpoint/2010/main" val="1633736428"/>
       </p:ext>
     </p:extLst>
   </p:cSld>
@@ -4087,7 +4163,7 @@
           <p:cNvPr id="2" name="Title 1">
             <a:extLst>
               <a:ext uri="{FF2B5EF4-FFF2-40B4-BE49-F238E27FC236}">
-                <a16:creationId xmlns:a16="http://schemas.microsoft.com/office/drawing/2014/main" id="{65FEEB9D-C258-6356-E64F-0226C0C1E2D9}"/>
+                <a16:creationId xmlns:a16="http://schemas.microsoft.com/office/drawing/2014/main" id="{05A2DF96-20C7-747C-7E82-DC4FE967DFDF}"/>
               </a:ext>
             </a:extLst>
           </p:cNvPr>
@@ -4105,7 +4181,7 @@
           <a:p>
             <a:r>
               <a:rPr lang="en-US" dirty="0"/>
-              <a:t>Feasibility Assessment</a:t>
+              <a:t>Interfaces</a:t>
             </a:r>
           </a:p>
         </p:txBody>
@@ -4115,7 +4191,7 @@
           <p:cNvPr id="3" name="Content Placeholder 2">
             <a:extLst>
               <a:ext uri="{FF2B5EF4-FFF2-40B4-BE49-F238E27FC236}">
-                <a16:creationId xmlns:a16="http://schemas.microsoft.com/office/drawing/2014/main" id="{8A3AF3FC-0E98-B368-78EC-704185C5ED60}"/>
+                <a16:creationId xmlns:a16="http://schemas.microsoft.com/office/drawing/2014/main" id="{3839CEE8-F836-F00E-4173-836D6B3D3F54}"/>
               </a:ext>
             </a:extLst>
           </p:cNvPr>
@@ -4134,61 +4210,20 @@
             <a:r>
               <a:rPr lang="en-US" dirty="0">
                 <a:solidFill>
-                  <a:schemeClr val="tx1"/>
+                  <a:schemeClr val="accent5">
+                    <a:lumMod val="75000"/>
+                  </a:schemeClr>
                 </a:solidFill>
               </a:rPr>
-              <a:t>What obstacles/challenges do you anticipate facing?</a:t>
-            </a:r>
-          </a:p>
-          <a:p>
-            <a:r>
-              <a:rPr lang="en-US" dirty="0">
-                <a:solidFill>
-                  <a:schemeClr val="tx1"/>
-                </a:solidFill>
-              </a:rPr>
-              <a:t>What aspects do you feel like your team has strong expertise in.</a:t>
-            </a:r>
-          </a:p>
-          <a:p>
-            <a:r>
-              <a:rPr lang="en-US" dirty="0">
-                <a:solidFill>
-                  <a:schemeClr val="tx1"/>
-                </a:solidFill>
-              </a:rPr>
-              <a:t>E.g., all team members have not used SolidWorks previously</a:t>
-            </a:r>
-          </a:p>
-          <a:p>
-            <a:r>
-              <a:rPr lang="en-US" dirty="0">
-                <a:solidFill>
-                  <a:schemeClr val="tx1"/>
-                </a:solidFill>
-              </a:rPr>
-              <a:t>Limited PCB experience</a:t>
-            </a:r>
-          </a:p>
-          <a:p>
-            <a:r>
-              <a:rPr lang="en-US" b="1" dirty="0">
-                <a:solidFill>
-                  <a:srgbClr val="7030A0"/>
-                </a:solidFill>
-              </a:rPr>
-              <a:t>Note how you plan to take on (mitigate) these challenges</a:t>
-            </a:r>
-          </a:p>
-          <a:p>
-            <a:endParaRPr lang="en-US" dirty="0"/>
+              <a:t>USB?</a:t>
+            </a:r>
           </a:p>
         </p:txBody>
       </p:sp>
     </p:spTree>
     <p:extLst>
       <p:ext uri="{BB962C8B-B14F-4D97-AF65-F5344CB8AC3E}">
-        <p14:creationId xmlns:p14="http://schemas.microsoft.com/office/powerpoint/2010/main" val="1862518142"/>
+        <p14:creationId xmlns:p14="http://schemas.microsoft.com/office/powerpoint/2010/main" val="1227231928"/>
       </p:ext>
     </p:extLst>
   </p:cSld>
@@ -4220,7 +4255,7 @@
           <p:cNvPr id="2" name="Title 1">
             <a:extLst>
               <a:ext uri="{FF2B5EF4-FFF2-40B4-BE49-F238E27FC236}">
-                <a16:creationId xmlns:a16="http://schemas.microsoft.com/office/drawing/2014/main" id="{C0F56C52-42C9-8915-9A88-1D4DA0DB215F}"/>
+                <a16:creationId xmlns:a16="http://schemas.microsoft.com/office/drawing/2014/main" id="{B67A333E-5C75-96D2-6959-292C687D5673}"/>
               </a:ext>
             </a:extLst>
           </p:cNvPr>
@@ -4238,7 +4273,7 @@
           <a:p>
             <a:r>
               <a:rPr lang="en-US" dirty="0"/>
-              <a:t>Risks</a:t>
+              <a:t>Cost/Budget</a:t>
             </a:r>
           </a:p>
         </p:txBody>
@@ -4248,7 +4283,7 @@
           <p:cNvPr id="3" name="Content Placeholder 2">
             <a:extLst>
               <a:ext uri="{FF2B5EF4-FFF2-40B4-BE49-F238E27FC236}">
-                <a16:creationId xmlns:a16="http://schemas.microsoft.com/office/drawing/2014/main" id="{5F98C425-5884-A2B1-0AE7-8D9E3272A391}"/>
+                <a16:creationId xmlns:a16="http://schemas.microsoft.com/office/drawing/2014/main" id="{0FF5FD38-A45D-7408-58B5-6DAAD75B63BB}"/>
               </a:ext>
             </a:extLst>
           </p:cNvPr>
@@ -4264,14 +4299,40 @@
           <a:bodyPr/>
           <a:lstStyle/>
           <a:p>
-            <a:endParaRPr lang="en-US"/>
+            <a:r>
+              <a:rPr lang="en-US" dirty="0">
+                <a:solidFill>
+                  <a:schemeClr val="accent5">
+                    <a:lumMod val="75000"/>
+                  </a:schemeClr>
+                </a:solidFill>
+              </a:rPr>
+              <a:t>Money go </a:t>
+            </a:r>
+            <a:r>
+              <a:rPr lang="en-US" dirty="0" err="1">
+                <a:solidFill>
+                  <a:schemeClr val="accent5">
+                    <a:lumMod val="75000"/>
+                  </a:schemeClr>
+                </a:solidFill>
+              </a:rPr>
+              <a:t>brrrr</a:t>
+            </a:r>
+            <a:endParaRPr lang="en-US" dirty="0">
+              <a:solidFill>
+                <a:schemeClr val="accent5">
+                  <a:lumMod val="75000"/>
+                </a:schemeClr>
+              </a:solidFill>
+            </a:endParaRPr>
           </a:p>
         </p:txBody>
       </p:sp>
     </p:spTree>
     <p:extLst>
       <p:ext uri="{BB962C8B-B14F-4D97-AF65-F5344CB8AC3E}">
-        <p14:creationId xmlns:p14="http://schemas.microsoft.com/office/powerpoint/2010/main" val="3951858451"/>
+        <p14:creationId xmlns:p14="http://schemas.microsoft.com/office/powerpoint/2010/main" val="982414475"/>
       </p:ext>
     </p:extLst>
   </p:cSld>
@@ -4282,6 +4343,190 @@
 </file>
 
 <file path=ppt/slides/slide13.xml><?xml version="1.0" encoding="utf-8"?>
+<p:sld xmlns:a="http://schemas.openxmlformats.org/drawingml/2006/main" xmlns:r="http://schemas.openxmlformats.org/officeDocument/2006/relationships" xmlns:p="http://schemas.openxmlformats.org/presentationml/2006/main">
+  <p:cSld>
+    <p:spTree>
+      <p:nvGrpSpPr>
+        <p:cNvPr id="1" name=""/>
+        <p:cNvGrpSpPr/>
+        <p:nvPr/>
+      </p:nvGrpSpPr>
+      <p:grpSpPr>
+        <a:xfrm>
+          <a:off x="0" y="0"/>
+          <a:ext cx="0" cy="0"/>
+          <a:chOff x="0" y="0"/>
+          <a:chExt cx="0" cy="0"/>
+        </a:xfrm>
+      </p:grpSpPr>
+      <p:sp>
+        <p:nvSpPr>
+          <p:cNvPr id="2" name="Title 1">
+            <a:extLst>
+              <a:ext uri="{FF2B5EF4-FFF2-40B4-BE49-F238E27FC236}">
+                <a16:creationId xmlns:a16="http://schemas.microsoft.com/office/drawing/2014/main" id="{65FEEB9D-C258-6356-E64F-0226C0C1E2D9}"/>
+              </a:ext>
+            </a:extLst>
+          </p:cNvPr>
+          <p:cNvSpPr>
+            <a:spLocks noGrp="1"/>
+          </p:cNvSpPr>
+          <p:nvPr>
+            <p:ph type="title"/>
+          </p:nvPr>
+        </p:nvSpPr>
+        <p:spPr/>
+        <p:txBody>
+          <a:bodyPr/>
+          <a:lstStyle/>
+          <a:p>
+            <a:r>
+              <a:rPr lang="en-US" dirty="0"/>
+              <a:t>Feasibility Assessment/Risks</a:t>
+            </a:r>
+          </a:p>
+        </p:txBody>
+      </p:sp>
+      <p:sp>
+        <p:nvSpPr>
+          <p:cNvPr id="3" name="Content Placeholder 2">
+            <a:extLst>
+              <a:ext uri="{FF2B5EF4-FFF2-40B4-BE49-F238E27FC236}">
+                <a16:creationId xmlns:a16="http://schemas.microsoft.com/office/drawing/2014/main" id="{8A3AF3FC-0E98-B368-78EC-704185C5ED60}"/>
+              </a:ext>
+            </a:extLst>
+          </p:cNvPr>
+          <p:cNvSpPr>
+            <a:spLocks noGrp="1"/>
+          </p:cNvSpPr>
+          <p:nvPr>
+            <p:ph idx="1"/>
+          </p:nvPr>
+        </p:nvSpPr>
+        <p:spPr/>
+        <p:txBody>
+          <a:bodyPr/>
+          <a:lstStyle/>
+          <a:p>
+            <a:r>
+              <a:rPr lang="en-US" dirty="0">
+                <a:solidFill>
+                  <a:schemeClr val="accent5">
+                    <a:lumMod val="75000"/>
+                  </a:schemeClr>
+                </a:solidFill>
+              </a:rPr>
+              <a:t>Temp</a:t>
+            </a:r>
+          </a:p>
+        </p:txBody>
+      </p:sp>
+    </p:spTree>
+    <p:extLst>
+      <p:ext uri="{BB962C8B-B14F-4D97-AF65-F5344CB8AC3E}">
+        <p14:creationId xmlns:p14="http://schemas.microsoft.com/office/powerpoint/2010/main" val="1862518142"/>
+      </p:ext>
+    </p:extLst>
+  </p:cSld>
+  <p:clrMapOvr>
+    <a:masterClrMapping/>
+  </p:clrMapOvr>
+</p:sld>
+</file>
+
+<file path=ppt/slides/slide14.xml><?xml version="1.0" encoding="utf-8"?>
+<p:sld xmlns:a="http://schemas.openxmlformats.org/drawingml/2006/main" xmlns:r="http://schemas.openxmlformats.org/officeDocument/2006/relationships" xmlns:p="http://schemas.openxmlformats.org/presentationml/2006/main">
+  <p:cSld>
+    <p:spTree>
+      <p:nvGrpSpPr>
+        <p:cNvPr id="1" name=""/>
+        <p:cNvGrpSpPr/>
+        <p:nvPr/>
+      </p:nvGrpSpPr>
+      <p:grpSpPr>
+        <a:xfrm>
+          <a:off x="0" y="0"/>
+          <a:ext cx="0" cy="0"/>
+          <a:chOff x="0" y="0"/>
+          <a:chExt cx="0" cy="0"/>
+        </a:xfrm>
+      </p:grpSpPr>
+      <p:sp>
+        <p:nvSpPr>
+          <p:cNvPr id="2" name="Title 1">
+            <a:extLst>
+              <a:ext uri="{FF2B5EF4-FFF2-40B4-BE49-F238E27FC236}">
+                <a16:creationId xmlns:a16="http://schemas.microsoft.com/office/drawing/2014/main" id="{65FEEB9D-C258-6356-E64F-0226C0C1E2D9}"/>
+              </a:ext>
+            </a:extLst>
+          </p:cNvPr>
+          <p:cNvSpPr>
+            <a:spLocks noGrp="1"/>
+          </p:cNvSpPr>
+          <p:nvPr>
+            <p:ph type="title"/>
+          </p:nvPr>
+        </p:nvSpPr>
+        <p:spPr/>
+        <p:txBody>
+          <a:bodyPr/>
+          <a:lstStyle/>
+          <a:p>
+            <a:r>
+              <a:rPr lang="en-US" dirty="0"/>
+              <a:t>Conclusion</a:t>
+            </a:r>
+          </a:p>
+        </p:txBody>
+      </p:sp>
+      <p:sp>
+        <p:nvSpPr>
+          <p:cNvPr id="3" name="Content Placeholder 2">
+            <a:extLst>
+              <a:ext uri="{FF2B5EF4-FFF2-40B4-BE49-F238E27FC236}">
+                <a16:creationId xmlns:a16="http://schemas.microsoft.com/office/drawing/2014/main" id="{8A3AF3FC-0E98-B368-78EC-704185C5ED60}"/>
+              </a:ext>
+            </a:extLst>
+          </p:cNvPr>
+          <p:cNvSpPr>
+            <a:spLocks noGrp="1"/>
+          </p:cNvSpPr>
+          <p:nvPr>
+            <p:ph idx="1"/>
+          </p:nvPr>
+        </p:nvSpPr>
+        <p:spPr/>
+        <p:txBody>
+          <a:bodyPr/>
+          <a:lstStyle/>
+          <a:p>
+            <a:r>
+              <a:rPr lang="en-US" dirty="0">
+                <a:solidFill>
+                  <a:schemeClr val="accent5">
+                    <a:lumMod val="75000"/>
+                  </a:schemeClr>
+                </a:solidFill>
+              </a:rPr>
+              <a:t>We’re just better</a:t>
+            </a:r>
+          </a:p>
+        </p:txBody>
+      </p:sp>
+    </p:spTree>
+    <p:extLst>
+      <p:ext uri="{BB962C8B-B14F-4D97-AF65-F5344CB8AC3E}">
+        <p14:creationId xmlns:p14="http://schemas.microsoft.com/office/powerpoint/2010/main" val="2912521005"/>
+      </p:ext>
+    </p:extLst>
+  </p:cSld>
+  <p:clrMapOvr>
+    <a:masterClrMapping/>
+  </p:clrMapOvr>
+</p:sld>
+</file>
+
+<file path=ppt/slides/slide15.xml><?xml version="1.0" encoding="utf-8"?>
 <p:sld xmlns:a="http://schemas.openxmlformats.org/drawingml/2006/main" xmlns:r="http://schemas.openxmlformats.org/officeDocument/2006/relationships" xmlns:p="http://schemas.openxmlformats.org/presentationml/2006/main">
   <p:cSld>
     <p:bg>
@@ -4966,7 +5211,7 @@
           <a:p>
             <a:r>
               <a:rPr lang="en-US" dirty="0"/>
-              <a:t>Objectives, Significance, and Novelty</a:t>
+              <a:t>Problem Statement</a:t>
             </a:r>
           </a:p>
         </p:txBody>
@@ -4992,13 +5237,13 @@
           <a:bodyPr/>
           <a:lstStyle/>
           <a:p>
-            <a:pPr marL="0" indent="0">
-              <a:buNone/>
-            </a:pPr>
-            <a:r>
-              <a:rPr lang="en-US" dirty="0"/>
-              <a:t>What, Why, Who</a:t>
-            </a:r>
+            <a:endParaRPr lang="en-US" dirty="0">
+              <a:solidFill>
+                <a:schemeClr val="accent5">
+                  <a:lumMod val="75000"/>
+                </a:schemeClr>
+              </a:solidFill>
+            </a:endParaRPr>
           </a:p>
         </p:txBody>
       </p:sp>
@@ -5037,7 +5282,7 @@
           <p:cNvPr id="2" name="Title 1">
             <a:extLst>
               <a:ext uri="{FF2B5EF4-FFF2-40B4-BE49-F238E27FC236}">
-                <a16:creationId xmlns:a16="http://schemas.microsoft.com/office/drawing/2014/main" id="{8D95EA1F-F84A-FF6B-061E-2FC8E95DF15C}"/>
+                <a16:creationId xmlns:a16="http://schemas.microsoft.com/office/drawing/2014/main" id="{49DD8DD4-C5CB-7204-5D16-1B480CDC3C7A}"/>
               </a:ext>
             </a:extLst>
           </p:cNvPr>
@@ -5055,7 +5300,7 @@
           <a:p>
             <a:r>
               <a:rPr lang="en-US" dirty="0"/>
-              <a:t>Requirements</a:t>
+              <a:t>Purpose and Objective</a:t>
             </a:r>
           </a:p>
         </p:txBody>
@@ -5065,7 +5310,7 @@
           <p:cNvPr id="3" name="Content Placeholder 2">
             <a:extLst>
               <a:ext uri="{FF2B5EF4-FFF2-40B4-BE49-F238E27FC236}">
-                <a16:creationId xmlns:a16="http://schemas.microsoft.com/office/drawing/2014/main" id="{B2680731-466C-C1C4-73C5-B799F0ECA6A8}"/>
+                <a16:creationId xmlns:a16="http://schemas.microsoft.com/office/drawing/2014/main" id="{CAC9CE07-C314-1001-50D4-4CA7C3C0DDD1}"/>
               </a:ext>
             </a:extLst>
           </p:cNvPr>
@@ -5081,9 +5326,18 @@
           <a:bodyPr/>
           <a:lstStyle/>
           <a:p>
-            <a:r>
-              <a:rPr lang="en-US" dirty="0"/>
-              <a:t>Requirements Table goes here c:</a:t>
+            <a:pPr marL="0" indent="0">
+              <a:buNone/>
+            </a:pPr>
+            <a:r>
+              <a:rPr lang="en-US" dirty="0">
+                <a:solidFill>
+                  <a:schemeClr val="accent5">
+                    <a:lumMod val="75000"/>
+                  </a:schemeClr>
+                </a:solidFill>
+              </a:rPr>
+              <a:t>What, Why, Who</a:t>
             </a:r>
           </a:p>
         </p:txBody>
@@ -5091,7 +5345,7 @@
     </p:spTree>
     <p:extLst>
       <p:ext uri="{BB962C8B-B14F-4D97-AF65-F5344CB8AC3E}">
-        <p14:creationId xmlns:p14="http://schemas.microsoft.com/office/powerpoint/2010/main" val="1707080232"/>
+        <p14:creationId xmlns:p14="http://schemas.microsoft.com/office/powerpoint/2010/main" val="2347619281"/>
       </p:ext>
     </p:extLst>
   </p:cSld>
@@ -5123,7 +5377,7 @@
           <p:cNvPr id="2" name="Title 1">
             <a:extLst>
               <a:ext uri="{FF2B5EF4-FFF2-40B4-BE49-F238E27FC236}">
-                <a16:creationId xmlns:a16="http://schemas.microsoft.com/office/drawing/2014/main" id="{1DA02BB8-01E2-8330-AF3B-A60F3E480F14}"/>
+                <a16:creationId xmlns:a16="http://schemas.microsoft.com/office/drawing/2014/main" id="{8D95EA1F-F84A-FF6B-061E-2FC8E95DF15C}"/>
               </a:ext>
             </a:extLst>
           </p:cNvPr>
@@ -5141,7 +5395,7 @@
           <a:p>
             <a:r>
               <a:rPr lang="en-US" dirty="0"/>
-              <a:t>Design Concept 1</a:t>
+              <a:t>Customer and System Requirements</a:t>
             </a:r>
           </a:p>
         </p:txBody>
@@ -5151,7 +5405,7 @@
           <p:cNvPr id="3" name="Content Placeholder 2">
             <a:extLst>
               <a:ext uri="{FF2B5EF4-FFF2-40B4-BE49-F238E27FC236}">
-                <a16:creationId xmlns:a16="http://schemas.microsoft.com/office/drawing/2014/main" id="{5C0AC1E4-8DDB-4D15-9516-C3BA994C4CE0}"/>
+                <a16:creationId xmlns:a16="http://schemas.microsoft.com/office/drawing/2014/main" id="{B2680731-466C-C1C4-73C5-B799F0ECA6A8}"/>
               </a:ext>
             </a:extLst>
           </p:cNvPr>
@@ -5167,14 +5421,23 @@
           <a:bodyPr/>
           <a:lstStyle/>
           <a:p>
-            <a:endParaRPr lang="en-US"/>
+            <a:r>
+              <a:rPr lang="en-US" dirty="0">
+                <a:solidFill>
+                  <a:schemeClr val="accent5">
+                    <a:lumMod val="75000"/>
+                  </a:schemeClr>
+                </a:solidFill>
+              </a:rPr>
+              <a:t>Requirements Table goes here c:</a:t>
+            </a:r>
           </a:p>
         </p:txBody>
       </p:sp>
     </p:spTree>
     <p:extLst>
       <p:ext uri="{BB962C8B-B14F-4D97-AF65-F5344CB8AC3E}">
-        <p14:creationId xmlns:p14="http://schemas.microsoft.com/office/powerpoint/2010/main" val="756041692"/>
+        <p14:creationId xmlns:p14="http://schemas.microsoft.com/office/powerpoint/2010/main" val="1707080232"/>
       </p:ext>
     </p:extLst>
   </p:cSld>
@@ -5224,7 +5487,7 @@
           <a:p>
             <a:r>
               <a:rPr lang="en-US" dirty="0"/>
-              <a:t>Design Concept 2</a:t>
+              <a:t>Design Concept 1: Microcontroller</a:t>
             </a:r>
           </a:p>
         </p:txBody>
@@ -5250,14 +5513,20 @@
           <a:bodyPr/>
           <a:lstStyle/>
           <a:p>
-            <a:endParaRPr lang="en-US"/>
+            <a:endParaRPr lang="en-US" dirty="0">
+              <a:solidFill>
+                <a:schemeClr val="accent5">
+                  <a:lumMod val="75000"/>
+                </a:schemeClr>
+              </a:solidFill>
+            </a:endParaRPr>
           </a:p>
         </p:txBody>
       </p:sp>
     </p:spTree>
     <p:extLst>
       <p:ext uri="{BB962C8B-B14F-4D97-AF65-F5344CB8AC3E}">
-        <p14:creationId xmlns:p14="http://schemas.microsoft.com/office/powerpoint/2010/main" val="3582709406"/>
+        <p14:creationId xmlns:p14="http://schemas.microsoft.com/office/powerpoint/2010/main" val="756041692"/>
       </p:ext>
     </p:extLst>
   </p:cSld>
@@ -5307,7 +5576,7 @@
           <a:p>
             <a:r>
               <a:rPr lang="en-US" dirty="0"/>
-              <a:t>Microcontroller Options</a:t>
+              <a:t>Design Concept 2: FPGA</a:t>
             </a:r>
           </a:p>
         </p:txBody>
@@ -5333,14 +5602,20 @@
           <a:bodyPr/>
           <a:lstStyle/>
           <a:p>
-            <a:endParaRPr lang="en-US"/>
+            <a:endParaRPr lang="en-US" dirty="0">
+              <a:solidFill>
+                <a:schemeClr val="accent5">
+                  <a:lumMod val="75000"/>
+                </a:schemeClr>
+              </a:solidFill>
+            </a:endParaRPr>
           </a:p>
         </p:txBody>
       </p:sp>
     </p:spTree>
     <p:extLst>
       <p:ext uri="{BB962C8B-B14F-4D97-AF65-F5344CB8AC3E}">
-        <p14:creationId xmlns:p14="http://schemas.microsoft.com/office/powerpoint/2010/main" val="4269999711"/>
+        <p14:creationId xmlns:p14="http://schemas.microsoft.com/office/powerpoint/2010/main" val="3582709406"/>
       </p:ext>
     </p:extLst>
   </p:cSld>
@@ -5372,7 +5647,7 @@
           <p:cNvPr id="2" name="Title 1">
             <a:extLst>
               <a:ext uri="{FF2B5EF4-FFF2-40B4-BE49-F238E27FC236}">
-                <a16:creationId xmlns:a16="http://schemas.microsoft.com/office/drawing/2014/main" id="{A74D06A3-50B4-29B1-F04C-E576943108F2}"/>
+                <a16:creationId xmlns:a16="http://schemas.microsoft.com/office/drawing/2014/main" id="{1DA02BB8-01E2-8330-AF3B-A60F3E480F14}"/>
               </a:ext>
             </a:extLst>
           </p:cNvPr>
@@ -5390,7 +5665,7 @@
           <a:p>
             <a:r>
               <a:rPr lang="en-US" dirty="0"/>
-              <a:t>Trade Studies and Design Alternatives</a:t>
+              <a:t>Microcontroller Options</a:t>
             </a:r>
           </a:p>
         </p:txBody>
@@ -5400,7 +5675,7 @@
           <p:cNvPr id="3" name="Content Placeholder 2">
             <a:extLst>
               <a:ext uri="{FF2B5EF4-FFF2-40B4-BE49-F238E27FC236}">
-                <a16:creationId xmlns:a16="http://schemas.microsoft.com/office/drawing/2014/main" id="{A752859F-349D-32EE-DD6E-B71413F03342}"/>
+                <a16:creationId xmlns:a16="http://schemas.microsoft.com/office/drawing/2014/main" id="{5C0AC1E4-8DDB-4D15-9516-C3BA994C4CE0}"/>
               </a:ext>
             </a:extLst>
           </p:cNvPr>
@@ -5416,14 +5691,20 @@
           <a:bodyPr/>
           <a:lstStyle/>
           <a:p>
-            <a:endParaRPr lang="en-US"/>
+            <a:endParaRPr lang="en-US" dirty="0">
+              <a:solidFill>
+                <a:schemeClr val="accent5">
+                  <a:lumMod val="75000"/>
+                </a:schemeClr>
+              </a:solidFill>
+            </a:endParaRPr>
           </a:p>
         </p:txBody>
       </p:sp>
     </p:spTree>
     <p:extLst>
       <p:ext uri="{BB962C8B-B14F-4D97-AF65-F5344CB8AC3E}">
-        <p14:creationId xmlns:p14="http://schemas.microsoft.com/office/powerpoint/2010/main" val="3763922397"/>
+        <p14:creationId xmlns:p14="http://schemas.microsoft.com/office/powerpoint/2010/main" val="4269999711"/>
       </p:ext>
     </p:extLst>
   </p:cSld>
@@ -5455,7 +5736,7 @@
           <p:cNvPr id="2" name="Title 1">
             <a:extLst>
               <a:ext uri="{FF2B5EF4-FFF2-40B4-BE49-F238E27FC236}">
-                <a16:creationId xmlns:a16="http://schemas.microsoft.com/office/drawing/2014/main" id="{D4D58CD2-045B-1678-36BB-865E2FF7028A}"/>
+                <a16:creationId xmlns:a16="http://schemas.microsoft.com/office/drawing/2014/main" id="{A74D06A3-50B4-29B1-F04C-E576943108F2}"/>
               </a:ext>
             </a:extLst>
           </p:cNvPr>
@@ -5473,7 +5754,7 @@
           <a:p>
             <a:r>
               <a:rPr lang="en-US" dirty="0"/>
-              <a:t>Block Diagram</a:t>
+              <a:t>Design Criteria Table</a:t>
             </a:r>
           </a:p>
         </p:txBody>
@@ -5483,7 +5764,7 @@
           <p:cNvPr id="3" name="Content Placeholder 2">
             <a:extLst>
               <a:ext uri="{FF2B5EF4-FFF2-40B4-BE49-F238E27FC236}">
-                <a16:creationId xmlns:a16="http://schemas.microsoft.com/office/drawing/2014/main" id="{382034F8-C186-6B44-10C4-98CA9EB9D596}"/>
+                <a16:creationId xmlns:a16="http://schemas.microsoft.com/office/drawing/2014/main" id="{A752859F-349D-32EE-DD6E-B71413F03342}"/>
               </a:ext>
             </a:extLst>
           </p:cNvPr>
@@ -5499,86 +5780,20 @@
           <a:bodyPr/>
           <a:lstStyle/>
           <a:p>
-            <a:r>
-              <a:rPr lang="en-US" dirty="0"/>
-              <a:t>We need a block diagram c:</a:t>
-            </a:r>
-          </a:p>
-        </p:txBody>
-      </p:sp>
-      <p:graphicFrame>
-        <p:nvGraphicFramePr>
-          <p:cNvPr id="12" name="Object 11">
-            <a:extLst>
-              <a:ext uri="{FF2B5EF4-FFF2-40B4-BE49-F238E27FC236}">
-                <a16:creationId xmlns:a16="http://schemas.microsoft.com/office/drawing/2014/main" id="{166FE0A4-4D8B-C501-D415-931635258017}"/>
-              </a:ext>
-            </a:extLst>
-          </p:cNvPr>
-          <p:cNvGraphicFramePr>
-            <a:graphicFrameLocks noChangeAspect="1"/>
-          </p:cNvGraphicFramePr>
-          <p:nvPr>
-            <p:extLst>
-              <p:ext uri="{D42A27DB-BD31-4B8C-83A1-F6EECF244321}">
-                <p14:modId xmlns:p14="http://schemas.microsoft.com/office/powerpoint/2010/main" val="40233665"/>
-              </p:ext>
-            </p:extLst>
-          </p:nvPr>
-        </p:nvGraphicFramePr>
-        <p:xfrm>
-          <a:off x="6627353" y="221456"/>
-          <a:ext cx="4533900" cy="6415087"/>
-        </p:xfrm>
-        <a:graphic>
-          <a:graphicData uri="http://schemas.openxmlformats.org/presentationml/2006/ole">
-            <mc:AlternateContent xmlns:mc="http://schemas.openxmlformats.org/markup-compatibility/2006">
-              <mc:Choice xmlns:v="urn:schemas-microsoft-com:vml" Requires="v">
-                <p:oleObj name="Acrobat Document" r:id="rId2" imgW="4533723" imgH="6415677" progId="Acrobat.Document.DC">
-                  <p:embed/>
-                </p:oleObj>
-              </mc:Choice>
-              <mc:Fallback>
-                <p:oleObj name="Acrobat Document" r:id="rId2" imgW="4533723" imgH="6415677" progId="Acrobat.Document.DC">
-                  <p:embed/>
-                  <p:pic>
-                    <p:nvPicPr>
-                      <p:cNvPr id="12" name="Object 11">
-                        <a:extLst>
-                          <a:ext uri="{FF2B5EF4-FFF2-40B4-BE49-F238E27FC236}">
-                            <a16:creationId xmlns:a16="http://schemas.microsoft.com/office/drawing/2014/main" id="{166FE0A4-4D8B-C501-D415-931635258017}"/>
-                          </a:ext>
-                        </a:extLst>
-                      </p:cNvPr>
-                      <p:cNvPicPr/>
-                      <p:nvPr/>
-                    </p:nvPicPr>
-                    <p:blipFill>
-                      <a:blip r:embed="rId3"/>
-                      <a:stretch>
-                        <a:fillRect/>
-                      </a:stretch>
-                    </p:blipFill>
-                    <p:spPr>
-                      <a:xfrm>
-                        <a:off x="6627353" y="221456"/>
-                        <a:ext cx="4533900" cy="6415087"/>
-                      </a:xfrm>
-                      <a:prstGeom prst="rect">
-                        <a:avLst/>
-                      </a:prstGeom>
-                    </p:spPr>
-                  </p:pic>
-                </p:oleObj>
-              </mc:Fallback>
-            </mc:AlternateContent>
-          </a:graphicData>
-        </a:graphic>
-      </p:graphicFrame>
+            <a:endParaRPr lang="en-US" dirty="0">
+              <a:solidFill>
+                <a:schemeClr val="accent5">
+                  <a:lumMod val="75000"/>
+                </a:schemeClr>
+              </a:solidFill>
+            </a:endParaRPr>
+          </a:p>
+        </p:txBody>
+      </p:sp>
     </p:spTree>
     <p:extLst>
       <p:ext uri="{BB962C8B-B14F-4D97-AF65-F5344CB8AC3E}">
-        <p14:creationId xmlns:p14="http://schemas.microsoft.com/office/powerpoint/2010/main" val="1633736428"/>
+        <p14:creationId xmlns:p14="http://schemas.microsoft.com/office/powerpoint/2010/main" val="3763922397"/>
       </p:ext>
     </p:extLst>
   </p:cSld>
@@ -5610,7 +5825,7 @@
           <p:cNvPr id="2" name="Title 1">
             <a:extLst>
               <a:ext uri="{FF2B5EF4-FFF2-40B4-BE49-F238E27FC236}">
-                <a16:creationId xmlns:a16="http://schemas.microsoft.com/office/drawing/2014/main" id="{05A2DF96-20C7-747C-7E82-DC4FE967DFDF}"/>
+                <a16:creationId xmlns:a16="http://schemas.microsoft.com/office/drawing/2014/main" id="{3A1CEDC2-893C-CF43-1F41-5199C65CABA2}"/>
               </a:ext>
             </a:extLst>
           </p:cNvPr>
@@ -5628,7 +5843,7 @@
           <a:p>
             <a:r>
               <a:rPr lang="en-US" dirty="0"/>
-              <a:t>Interfaces</a:t>
+              <a:t>Final Score and Selected Design</a:t>
             </a:r>
           </a:p>
         </p:txBody>
@@ -5638,7 +5853,7 @@
           <p:cNvPr id="3" name="Content Placeholder 2">
             <a:extLst>
               <a:ext uri="{FF2B5EF4-FFF2-40B4-BE49-F238E27FC236}">
-                <a16:creationId xmlns:a16="http://schemas.microsoft.com/office/drawing/2014/main" id="{3839CEE8-F836-F00E-4173-836D6B3D3F54}"/>
+                <a16:creationId xmlns:a16="http://schemas.microsoft.com/office/drawing/2014/main" id="{F2D43D32-B7E3-F4AE-CFC3-F57FA93EBFBB}"/>
               </a:ext>
             </a:extLst>
           </p:cNvPr>
@@ -5654,17 +5869,20 @@
           <a:bodyPr/>
           <a:lstStyle/>
           <a:p>
-            <a:r>
-              <a:rPr lang="en-US" dirty="0"/>
-              <a:t>USB?</a:t>
-            </a:r>
+            <a:endParaRPr lang="en-US" dirty="0">
+              <a:solidFill>
+                <a:schemeClr val="accent5">
+                  <a:lumMod val="75000"/>
+                </a:schemeClr>
+              </a:solidFill>
+            </a:endParaRPr>
           </a:p>
         </p:txBody>
       </p:sp>
     </p:spTree>
     <p:extLst>
       <p:ext uri="{BB962C8B-B14F-4D97-AF65-F5344CB8AC3E}">
-        <p14:creationId xmlns:p14="http://schemas.microsoft.com/office/powerpoint/2010/main" val="1227231928"/>
+        <p14:creationId xmlns:p14="http://schemas.microsoft.com/office/powerpoint/2010/main" val="1831747689"/>
       </p:ext>
     </p:extLst>
   </p:cSld>
@@ -5990,20 +6208,20 @@
 </file>
 
 <file path=customXml/item1.xml><?xml version="1.0" encoding="utf-8"?>
+<p:properties xmlns:p="http://schemas.microsoft.com/office/2006/metadata/properties" xmlns:xsi="http://www.w3.org/2001/XMLSchema-instance" xmlns:pc="http://schemas.microsoft.com/office/infopath/2007/PartnerControls">
+  <documentManagement>
+    <_activity xmlns="218cae68-0ddc-43bb-9a29-52a0402d6cb9" xsi:nil="true"/>
+  </documentManagement>
+</p:properties>
+</file>
+
+<file path=customXml/item2.xml><?xml version="1.0" encoding="utf-8"?>
 <?mso-contentType ?>
 <FormTemplates xmlns="http://schemas.microsoft.com/sharepoint/v3/contenttype/forms">
   <Display>DocumentLibraryForm</Display>
   <Edit>DocumentLibraryForm</Edit>
   <New>DocumentLibraryForm</New>
 </FormTemplates>
-</file>
-
-<file path=customXml/item2.xml><?xml version="1.0" encoding="utf-8"?>
-<p:properties xmlns:p="http://schemas.microsoft.com/office/2006/metadata/properties" xmlns:xsi="http://www.w3.org/2001/XMLSchema-instance" xmlns:pc="http://schemas.microsoft.com/office/infopath/2007/PartnerControls">
-  <documentManagement>
-    <_activity xmlns="218cae68-0ddc-43bb-9a29-52a0402d6cb9" xsi:nil="true"/>
-  </documentManagement>
-</p:properties>
 </file>
 
 <file path=customXml/item3.xml><?xml version="1.0" encoding="utf-8"?>
@@ -6240,14 +6458,6 @@
 </file>
 
 <file path=customXml/itemProps1.xml><?xml version="1.0" encoding="utf-8"?>
-<ds:datastoreItem xmlns:ds="http://schemas.openxmlformats.org/officeDocument/2006/customXml" ds:itemID="{3A69843A-82BD-41BC-9CFD-7A6BCBCF50D4}">
-  <ds:schemaRefs>
-    <ds:schemaRef ds:uri="http://schemas.microsoft.com/sharepoint/v3/contenttype/forms"/>
-  </ds:schemaRefs>
-</ds:datastoreItem>
-</file>
-
-<file path=customXml/itemProps2.xml><?xml version="1.0" encoding="utf-8"?>
 <ds:datastoreItem xmlns:ds="http://schemas.openxmlformats.org/officeDocument/2006/customXml" ds:itemID="{B218F515-3D1B-44A5-8439-DF0479902099}">
   <ds:schemaRefs>
     <ds:schemaRef ds:uri="http://purl.org/dc/dcmitype/"/>
@@ -6260,6 +6470,14 @@
     <ds:schemaRef ds:uri="703aeb73-56ce-48f3-9277-f60cff690132"/>
     <ds:schemaRef ds:uri="http://schemas.microsoft.com/office/2006/metadata/properties"/>
     <ds:schemaRef ds:uri="http://purl.org/dc/elements/1.1/"/>
+  </ds:schemaRefs>
+</ds:datastoreItem>
+</file>
+
+<file path=customXml/itemProps2.xml><?xml version="1.0" encoding="utf-8"?>
+<ds:datastoreItem xmlns:ds="http://schemas.openxmlformats.org/officeDocument/2006/customXml" ds:itemID="{3A69843A-82BD-41BC-9CFD-7A6BCBCF50D4}">
+  <ds:schemaRefs>
+    <ds:schemaRef ds:uri="http://schemas.microsoft.com/sharepoint/v3/contenttype/forms"/>
   </ds:schemaRefs>
 </ds:datastoreItem>
 </file>

</xml_diff>

<commit_message>
presentation done lmao not really
</commit_message>
<xml_diff>
--- a/Documents/CDR/CDR_Presentation.pptx
+++ b/Documents/CDR/CDR_Presentation.pptx
@@ -4,6 +4,9 @@
   <p:sldMasterIdLst>
     <p:sldMasterId id="2147483648" r:id="rId4"/>
   </p:sldMasterIdLst>
+  <p:notesMasterIdLst>
+    <p:notesMasterId r:id="rId20"/>
+  </p:notesMasterIdLst>
   <p:sldIdLst>
     <p:sldId id="256" r:id="rId5"/>
     <p:sldId id="263" r:id="rId6"/>
@@ -16,11 +19,10 @@
     <p:sldId id="270" r:id="rId13"/>
     <p:sldId id="264" r:id="rId14"/>
     <p:sldId id="259" r:id="rId15"/>
-    <p:sldId id="266" r:id="rId16"/>
-    <p:sldId id="257" r:id="rId17"/>
-    <p:sldId id="267" r:id="rId18"/>
-    <p:sldId id="271" r:id="rId19"/>
-    <p:sldId id="268" r:id="rId20"/>
+    <p:sldId id="257" r:id="rId16"/>
+    <p:sldId id="267" r:id="rId17"/>
+    <p:sldId id="271" r:id="rId18"/>
+    <p:sldId id="268" r:id="rId19"/>
   </p:sldIdLst>
   <p:sldSz cx="12192000" cy="6858000"/>
   <p:notesSz cx="6858000" cy="9144000"/>
@@ -133,6 +135,1567 @@
     <p1510:client id="{36DA765A-6406-4451-AB9D-F4E704F36BB7}" v="24" dt="2024-09-27T16:26:04.071"/>
   </p1510:revLst>
 </p1510:revInfo>
+</file>
+
+<file path=ppt/notesMasters/notesMaster1.xml><?xml version="1.0" encoding="utf-8"?>
+<p:notesMaster xmlns:a="http://schemas.openxmlformats.org/drawingml/2006/main" xmlns:r="http://schemas.openxmlformats.org/officeDocument/2006/relationships" xmlns:p="http://schemas.openxmlformats.org/presentationml/2006/main">
+  <p:cSld>
+    <p:bg>
+      <p:bgRef idx="1001">
+        <a:schemeClr val="bg1"/>
+      </p:bgRef>
+    </p:bg>
+    <p:spTree>
+      <p:nvGrpSpPr>
+        <p:cNvPr id="1" name=""/>
+        <p:cNvGrpSpPr/>
+        <p:nvPr/>
+      </p:nvGrpSpPr>
+      <p:grpSpPr>
+        <a:xfrm>
+          <a:off x="0" y="0"/>
+          <a:ext cx="0" cy="0"/>
+          <a:chOff x="0" y="0"/>
+          <a:chExt cx="0" cy="0"/>
+        </a:xfrm>
+      </p:grpSpPr>
+      <p:sp>
+        <p:nvSpPr>
+          <p:cNvPr id="2" name="Header Placeholder 1"/>
+          <p:cNvSpPr>
+            <a:spLocks noGrp="1"/>
+          </p:cNvSpPr>
+          <p:nvPr>
+            <p:ph type="hdr" sz="quarter"/>
+          </p:nvPr>
+        </p:nvSpPr>
+        <p:spPr>
+          <a:xfrm>
+            <a:off x="0" y="0"/>
+            <a:ext cx="2971800" cy="458788"/>
+          </a:xfrm>
+          <a:prstGeom prst="rect">
+            <a:avLst/>
+          </a:prstGeom>
+        </p:spPr>
+        <p:txBody>
+          <a:bodyPr vert="horz" lIns="91440" tIns="45720" rIns="91440" bIns="45720" rtlCol="0"/>
+          <a:lstStyle>
+            <a:lvl1pPr algn="l">
+              <a:defRPr sz="1200"/>
+            </a:lvl1pPr>
+          </a:lstStyle>
+          <a:p>
+            <a:endParaRPr lang="en-US"/>
+          </a:p>
+        </p:txBody>
+      </p:sp>
+      <p:sp>
+        <p:nvSpPr>
+          <p:cNvPr id="3" name="Date Placeholder 2"/>
+          <p:cNvSpPr>
+            <a:spLocks noGrp="1"/>
+          </p:cNvSpPr>
+          <p:nvPr>
+            <p:ph type="dt" idx="1"/>
+          </p:nvPr>
+        </p:nvSpPr>
+        <p:spPr>
+          <a:xfrm>
+            <a:off x="3884613" y="0"/>
+            <a:ext cx="2971800" cy="458788"/>
+          </a:xfrm>
+          <a:prstGeom prst="rect">
+            <a:avLst/>
+          </a:prstGeom>
+        </p:spPr>
+        <p:txBody>
+          <a:bodyPr vert="horz" lIns="91440" tIns="45720" rIns="91440" bIns="45720" rtlCol="0"/>
+          <a:lstStyle>
+            <a:lvl1pPr algn="r">
+              <a:defRPr sz="1200"/>
+            </a:lvl1pPr>
+          </a:lstStyle>
+          <a:p>
+            <a:fld id="{C3DCE7EF-75D0-4DB7-BD1A-FC94188B4058}" type="datetimeFigureOut">
+              <a:rPr lang="en-US" smtClean="0"/>
+              <a:t>10/6/2024</a:t>
+            </a:fld>
+            <a:endParaRPr lang="en-US"/>
+          </a:p>
+        </p:txBody>
+      </p:sp>
+      <p:sp>
+        <p:nvSpPr>
+          <p:cNvPr id="4" name="Slide Image Placeholder 3"/>
+          <p:cNvSpPr>
+            <a:spLocks noGrp="1" noRot="1" noChangeAspect="1"/>
+          </p:cNvSpPr>
+          <p:nvPr>
+            <p:ph type="sldImg" idx="2"/>
+          </p:nvPr>
+        </p:nvSpPr>
+        <p:spPr>
+          <a:xfrm>
+            <a:off x="685800" y="1143000"/>
+            <a:ext cx="5486400" cy="3086100"/>
+          </a:xfrm>
+          <a:prstGeom prst="rect">
+            <a:avLst/>
+          </a:prstGeom>
+          <a:noFill/>
+          <a:ln w="12700">
+            <a:solidFill>
+              <a:prstClr val="black"/>
+            </a:solidFill>
+          </a:ln>
+        </p:spPr>
+        <p:txBody>
+          <a:bodyPr vert="horz" lIns="91440" tIns="45720" rIns="91440" bIns="45720" rtlCol="0" anchor="ctr"/>
+          <a:lstStyle/>
+          <a:p>
+            <a:endParaRPr lang="en-US"/>
+          </a:p>
+        </p:txBody>
+      </p:sp>
+      <p:sp>
+        <p:nvSpPr>
+          <p:cNvPr id="5" name="Notes Placeholder 4"/>
+          <p:cNvSpPr>
+            <a:spLocks noGrp="1"/>
+          </p:cNvSpPr>
+          <p:nvPr>
+            <p:ph type="body" sz="quarter" idx="3"/>
+          </p:nvPr>
+        </p:nvSpPr>
+        <p:spPr>
+          <a:xfrm>
+            <a:off x="685800" y="4400550"/>
+            <a:ext cx="5486400" cy="3600450"/>
+          </a:xfrm>
+          <a:prstGeom prst="rect">
+            <a:avLst/>
+          </a:prstGeom>
+        </p:spPr>
+        <p:txBody>
+          <a:bodyPr vert="horz" lIns="91440" tIns="45720" rIns="91440" bIns="45720" rtlCol="0"/>
+          <a:lstStyle/>
+          <a:p>
+            <a:pPr lvl="0"/>
+            <a:r>
+              <a:rPr lang="en-US"/>
+              <a:t>Click to edit Master text styles</a:t>
+            </a:r>
+          </a:p>
+          <a:p>
+            <a:pPr lvl="1"/>
+            <a:r>
+              <a:rPr lang="en-US"/>
+              <a:t>Second level</a:t>
+            </a:r>
+          </a:p>
+          <a:p>
+            <a:pPr lvl="2"/>
+            <a:r>
+              <a:rPr lang="en-US"/>
+              <a:t>Third level</a:t>
+            </a:r>
+          </a:p>
+          <a:p>
+            <a:pPr lvl="3"/>
+            <a:r>
+              <a:rPr lang="en-US"/>
+              <a:t>Fourth level</a:t>
+            </a:r>
+          </a:p>
+          <a:p>
+            <a:pPr lvl="4"/>
+            <a:r>
+              <a:rPr lang="en-US"/>
+              <a:t>Fifth level</a:t>
+            </a:r>
+          </a:p>
+        </p:txBody>
+      </p:sp>
+      <p:sp>
+        <p:nvSpPr>
+          <p:cNvPr id="6" name="Footer Placeholder 5"/>
+          <p:cNvSpPr>
+            <a:spLocks noGrp="1"/>
+          </p:cNvSpPr>
+          <p:nvPr>
+            <p:ph type="ftr" sz="quarter" idx="4"/>
+          </p:nvPr>
+        </p:nvSpPr>
+        <p:spPr>
+          <a:xfrm>
+            <a:off x="0" y="8685213"/>
+            <a:ext cx="2971800" cy="458787"/>
+          </a:xfrm>
+          <a:prstGeom prst="rect">
+            <a:avLst/>
+          </a:prstGeom>
+        </p:spPr>
+        <p:txBody>
+          <a:bodyPr vert="horz" lIns="91440" tIns="45720" rIns="91440" bIns="45720" rtlCol="0" anchor="b"/>
+          <a:lstStyle>
+            <a:lvl1pPr algn="l">
+              <a:defRPr sz="1200"/>
+            </a:lvl1pPr>
+          </a:lstStyle>
+          <a:p>
+            <a:endParaRPr lang="en-US"/>
+          </a:p>
+        </p:txBody>
+      </p:sp>
+      <p:sp>
+        <p:nvSpPr>
+          <p:cNvPr id="7" name="Slide Number Placeholder 6"/>
+          <p:cNvSpPr>
+            <a:spLocks noGrp="1"/>
+          </p:cNvSpPr>
+          <p:nvPr>
+            <p:ph type="sldNum" sz="quarter" idx="5"/>
+          </p:nvPr>
+        </p:nvSpPr>
+        <p:spPr>
+          <a:xfrm>
+            <a:off x="3884613" y="8685213"/>
+            <a:ext cx="2971800" cy="458787"/>
+          </a:xfrm>
+          <a:prstGeom prst="rect">
+            <a:avLst/>
+          </a:prstGeom>
+        </p:spPr>
+        <p:txBody>
+          <a:bodyPr vert="horz" lIns="91440" tIns="45720" rIns="91440" bIns="45720" rtlCol="0" anchor="b"/>
+          <a:lstStyle>
+            <a:lvl1pPr algn="r">
+              <a:defRPr sz="1200"/>
+            </a:lvl1pPr>
+          </a:lstStyle>
+          <a:p>
+            <a:fld id="{E30B86DD-1E4E-4BA9-90B9-02C65521F8DF}" type="slidenum">
+              <a:rPr lang="en-US" smtClean="0"/>
+              <a:t>‹#›</a:t>
+            </a:fld>
+            <a:endParaRPr lang="en-US"/>
+          </a:p>
+        </p:txBody>
+      </p:sp>
+    </p:spTree>
+    <p:extLst>
+      <p:ext uri="{BB962C8B-B14F-4D97-AF65-F5344CB8AC3E}">
+        <p14:creationId xmlns:p14="http://schemas.microsoft.com/office/powerpoint/2010/main" val="3363992694"/>
+      </p:ext>
+    </p:extLst>
+  </p:cSld>
+  <p:clrMap bg1="lt1" tx1="dk1" bg2="lt2" tx2="dk2" accent1="accent1" accent2="accent2" accent3="accent3" accent4="accent4" accent5="accent5" accent6="accent6" hlink="hlink" folHlink="folHlink"/>
+  <p:notesStyle>
+    <a:lvl1pPr marL="0" algn="l" defTabSz="914400" rtl="0" eaLnBrk="1" latinLnBrk="0" hangingPunct="1">
+      <a:defRPr sz="1200" kern="1200">
+        <a:solidFill>
+          <a:schemeClr val="tx1"/>
+        </a:solidFill>
+        <a:latin typeface="+mn-lt"/>
+        <a:ea typeface="+mn-ea"/>
+        <a:cs typeface="+mn-cs"/>
+      </a:defRPr>
+    </a:lvl1pPr>
+    <a:lvl2pPr marL="457200" algn="l" defTabSz="914400" rtl="0" eaLnBrk="1" latinLnBrk="0" hangingPunct="1">
+      <a:defRPr sz="1200" kern="1200">
+        <a:solidFill>
+          <a:schemeClr val="tx1"/>
+        </a:solidFill>
+        <a:latin typeface="+mn-lt"/>
+        <a:ea typeface="+mn-ea"/>
+        <a:cs typeface="+mn-cs"/>
+      </a:defRPr>
+    </a:lvl2pPr>
+    <a:lvl3pPr marL="914400" algn="l" defTabSz="914400" rtl="0" eaLnBrk="1" latinLnBrk="0" hangingPunct="1">
+      <a:defRPr sz="1200" kern="1200">
+        <a:solidFill>
+          <a:schemeClr val="tx1"/>
+        </a:solidFill>
+        <a:latin typeface="+mn-lt"/>
+        <a:ea typeface="+mn-ea"/>
+        <a:cs typeface="+mn-cs"/>
+      </a:defRPr>
+    </a:lvl3pPr>
+    <a:lvl4pPr marL="1371600" algn="l" defTabSz="914400" rtl="0" eaLnBrk="1" latinLnBrk="0" hangingPunct="1">
+      <a:defRPr sz="1200" kern="1200">
+        <a:solidFill>
+          <a:schemeClr val="tx1"/>
+        </a:solidFill>
+        <a:latin typeface="+mn-lt"/>
+        <a:ea typeface="+mn-ea"/>
+        <a:cs typeface="+mn-cs"/>
+      </a:defRPr>
+    </a:lvl4pPr>
+    <a:lvl5pPr marL="1828800" algn="l" defTabSz="914400" rtl="0" eaLnBrk="1" latinLnBrk="0" hangingPunct="1">
+      <a:defRPr sz="1200" kern="1200">
+        <a:solidFill>
+          <a:schemeClr val="tx1"/>
+        </a:solidFill>
+        <a:latin typeface="+mn-lt"/>
+        <a:ea typeface="+mn-ea"/>
+        <a:cs typeface="+mn-cs"/>
+      </a:defRPr>
+    </a:lvl5pPr>
+    <a:lvl6pPr marL="2286000" algn="l" defTabSz="914400" rtl="0" eaLnBrk="1" latinLnBrk="0" hangingPunct="1">
+      <a:defRPr sz="1200" kern="1200">
+        <a:solidFill>
+          <a:schemeClr val="tx1"/>
+        </a:solidFill>
+        <a:latin typeface="+mn-lt"/>
+        <a:ea typeface="+mn-ea"/>
+        <a:cs typeface="+mn-cs"/>
+      </a:defRPr>
+    </a:lvl6pPr>
+    <a:lvl7pPr marL="2743200" algn="l" defTabSz="914400" rtl="0" eaLnBrk="1" latinLnBrk="0" hangingPunct="1">
+      <a:defRPr sz="1200" kern="1200">
+        <a:solidFill>
+          <a:schemeClr val="tx1"/>
+        </a:solidFill>
+        <a:latin typeface="+mn-lt"/>
+        <a:ea typeface="+mn-ea"/>
+        <a:cs typeface="+mn-cs"/>
+      </a:defRPr>
+    </a:lvl7pPr>
+    <a:lvl8pPr marL="3200400" algn="l" defTabSz="914400" rtl="0" eaLnBrk="1" latinLnBrk="0" hangingPunct="1">
+      <a:defRPr sz="1200" kern="1200">
+        <a:solidFill>
+          <a:schemeClr val="tx1"/>
+        </a:solidFill>
+        <a:latin typeface="+mn-lt"/>
+        <a:ea typeface="+mn-ea"/>
+        <a:cs typeface="+mn-cs"/>
+      </a:defRPr>
+    </a:lvl8pPr>
+    <a:lvl9pPr marL="3657600" algn="l" defTabSz="914400" rtl="0" eaLnBrk="1" latinLnBrk="0" hangingPunct="1">
+      <a:defRPr sz="1200" kern="1200">
+        <a:solidFill>
+          <a:schemeClr val="tx1"/>
+        </a:solidFill>
+        <a:latin typeface="+mn-lt"/>
+        <a:ea typeface="+mn-ea"/>
+        <a:cs typeface="+mn-cs"/>
+      </a:defRPr>
+    </a:lvl9pPr>
+  </p:notesStyle>
+</p:notesMaster>
+</file>
+
+<file path=ppt/notesSlides/notesSlide1.xml><?xml version="1.0" encoding="utf-8"?>
+<p:notes xmlns:a="http://schemas.openxmlformats.org/drawingml/2006/main" xmlns:r="http://schemas.openxmlformats.org/officeDocument/2006/relationships" xmlns:p="http://schemas.openxmlformats.org/presentationml/2006/main">
+  <p:cSld>
+    <p:spTree>
+      <p:nvGrpSpPr>
+        <p:cNvPr id="1" name=""/>
+        <p:cNvGrpSpPr/>
+        <p:nvPr/>
+      </p:nvGrpSpPr>
+      <p:grpSpPr>
+        <a:xfrm>
+          <a:off x="0" y="0"/>
+          <a:ext cx="0" cy="0"/>
+          <a:chOff x="0" y="0"/>
+          <a:chExt cx="0" cy="0"/>
+        </a:xfrm>
+      </p:grpSpPr>
+      <p:sp>
+        <p:nvSpPr>
+          <p:cNvPr id="2" name="Slide Image Placeholder 1"/>
+          <p:cNvSpPr>
+            <a:spLocks noGrp="1" noRot="1" noChangeAspect="1"/>
+          </p:cNvSpPr>
+          <p:nvPr>
+            <p:ph type="sldImg"/>
+          </p:nvPr>
+        </p:nvSpPr>
+        <p:spPr/>
+      </p:sp>
+      <p:sp>
+        <p:nvSpPr>
+          <p:cNvPr id="3" name="Notes Placeholder 2"/>
+          <p:cNvSpPr>
+            <a:spLocks noGrp="1"/>
+          </p:cNvSpPr>
+          <p:nvPr>
+            <p:ph type="body" idx="1"/>
+          </p:nvPr>
+        </p:nvSpPr>
+        <p:spPr/>
+        <p:txBody>
+          <a:bodyPr/>
+          <a:lstStyle/>
+          <a:p>
+            <a:r>
+              <a:rPr lang="en-US" dirty="0"/>
+              <a:t>Tannyr</a:t>
+            </a:r>
+          </a:p>
+        </p:txBody>
+      </p:sp>
+      <p:sp>
+        <p:nvSpPr>
+          <p:cNvPr id="4" name="Slide Number Placeholder 3"/>
+          <p:cNvSpPr>
+            <a:spLocks noGrp="1"/>
+          </p:cNvSpPr>
+          <p:nvPr>
+            <p:ph type="sldNum" sz="quarter" idx="5"/>
+          </p:nvPr>
+        </p:nvSpPr>
+        <p:spPr/>
+        <p:txBody>
+          <a:bodyPr/>
+          <a:lstStyle/>
+          <a:p>
+            <a:fld id="{E30B86DD-1E4E-4BA9-90B9-02C65521F8DF}" type="slidenum">
+              <a:rPr lang="en-US" smtClean="0"/>
+              <a:t>2</a:t>
+            </a:fld>
+            <a:endParaRPr lang="en-US"/>
+          </a:p>
+        </p:txBody>
+      </p:sp>
+    </p:spTree>
+    <p:extLst>
+      <p:ext uri="{BB962C8B-B14F-4D97-AF65-F5344CB8AC3E}">
+        <p14:creationId xmlns:p14="http://schemas.microsoft.com/office/powerpoint/2010/main" val="2141216061"/>
+      </p:ext>
+    </p:extLst>
+  </p:cSld>
+  <p:clrMapOvr>
+    <a:masterClrMapping/>
+  </p:clrMapOvr>
+</p:notes>
+</file>
+
+<file path=ppt/notesSlides/notesSlide10.xml><?xml version="1.0" encoding="utf-8"?>
+<p:notes xmlns:a="http://schemas.openxmlformats.org/drawingml/2006/main" xmlns:r="http://schemas.openxmlformats.org/officeDocument/2006/relationships" xmlns:p="http://schemas.openxmlformats.org/presentationml/2006/main">
+  <p:cSld>
+    <p:spTree>
+      <p:nvGrpSpPr>
+        <p:cNvPr id="1" name=""/>
+        <p:cNvGrpSpPr/>
+        <p:nvPr/>
+      </p:nvGrpSpPr>
+      <p:grpSpPr>
+        <a:xfrm>
+          <a:off x="0" y="0"/>
+          <a:ext cx="0" cy="0"/>
+          <a:chOff x="0" y="0"/>
+          <a:chExt cx="0" cy="0"/>
+        </a:xfrm>
+      </p:grpSpPr>
+      <p:sp>
+        <p:nvSpPr>
+          <p:cNvPr id="2" name="Slide Image Placeholder 1"/>
+          <p:cNvSpPr>
+            <a:spLocks noGrp="1" noRot="1" noChangeAspect="1"/>
+          </p:cNvSpPr>
+          <p:nvPr>
+            <p:ph type="sldImg"/>
+          </p:nvPr>
+        </p:nvSpPr>
+        <p:spPr/>
+      </p:sp>
+      <p:sp>
+        <p:nvSpPr>
+          <p:cNvPr id="3" name="Notes Placeholder 2"/>
+          <p:cNvSpPr>
+            <a:spLocks noGrp="1"/>
+          </p:cNvSpPr>
+          <p:nvPr>
+            <p:ph type="body" idx="1"/>
+          </p:nvPr>
+        </p:nvSpPr>
+        <p:spPr/>
+        <p:txBody>
+          <a:bodyPr/>
+          <a:lstStyle/>
+          <a:p>
+            <a:pPr marL="0" indent="0">
+              <a:buFont typeface="Arial" panose="020B0604020202020204" pitchFamily="34" charset="0"/>
+              <a:buNone/>
+            </a:pPr>
+            <a:r>
+              <a:rPr lang="en-US" sz="1200" dirty="0">
+                <a:solidFill>
+                  <a:schemeClr val="accent5">
+                    <a:lumMod val="75000"/>
+                  </a:schemeClr>
+                </a:solidFill>
+              </a:rPr>
+              <a:t>Gannon</a:t>
+            </a:r>
+          </a:p>
+          <a:p>
+            <a:pPr marL="457200" indent="-457200">
+              <a:buFont typeface="Arial" panose="020B0604020202020204" pitchFamily="34" charset="0"/>
+              <a:buChar char="•"/>
+            </a:pPr>
+            <a:r>
+              <a:rPr lang="en-US" sz="1200" dirty="0">
+                <a:solidFill>
+                  <a:schemeClr val="accent5">
+                    <a:lumMod val="75000"/>
+                  </a:schemeClr>
+                </a:solidFill>
+              </a:rPr>
+              <a:t>USB – Used for taking data from flight computer.</a:t>
+            </a:r>
+          </a:p>
+          <a:p>
+            <a:pPr marL="457200" indent="-457200">
+              <a:buFont typeface="Arial" panose="020B0604020202020204" pitchFamily="34" charset="0"/>
+              <a:buChar char="•"/>
+            </a:pPr>
+            <a:r>
+              <a:rPr lang="en-US" sz="1200" dirty="0">
+                <a:solidFill>
+                  <a:schemeClr val="accent5">
+                    <a:lumMod val="75000"/>
+                  </a:schemeClr>
+                </a:solidFill>
+              </a:rPr>
+              <a:t>Microcontroller – ESP32 built in transceiver to get data via </a:t>
+            </a:r>
+            <a:r>
+              <a:rPr lang="en-US" sz="1200" dirty="0" err="1">
+                <a:solidFill>
+                  <a:schemeClr val="accent5">
+                    <a:lumMod val="75000"/>
+                  </a:schemeClr>
+                </a:solidFill>
+              </a:rPr>
+              <a:t>WiFi</a:t>
+            </a:r>
+            <a:r>
+              <a:rPr lang="en-US" sz="1200" dirty="0">
+                <a:solidFill>
+                  <a:schemeClr val="accent5">
+                    <a:lumMod val="75000"/>
+                  </a:schemeClr>
+                </a:solidFill>
+              </a:rPr>
+              <a:t>.</a:t>
+            </a:r>
+          </a:p>
+          <a:p>
+            <a:pPr marL="457200" indent="-457200">
+              <a:buFont typeface="Arial" panose="020B0604020202020204" pitchFamily="34" charset="0"/>
+              <a:buChar char="•"/>
+            </a:pPr>
+            <a:r>
+              <a:rPr lang="en-US" sz="1200" dirty="0">
+                <a:solidFill>
+                  <a:schemeClr val="accent5">
+                    <a:lumMod val="75000"/>
+                  </a:schemeClr>
+                </a:solidFill>
+              </a:rPr>
+              <a:t>Sensors – Uses SPI and I2C to communicate with board.</a:t>
+            </a:r>
+          </a:p>
+          <a:p>
+            <a:endParaRPr lang="en-US" dirty="0"/>
+          </a:p>
+        </p:txBody>
+      </p:sp>
+      <p:sp>
+        <p:nvSpPr>
+          <p:cNvPr id="4" name="Slide Number Placeholder 3"/>
+          <p:cNvSpPr>
+            <a:spLocks noGrp="1"/>
+          </p:cNvSpPr>
+          <p:nvPr>
+            <p:ph type="sldNum" sz="quarter" idx="5"/>
+          </p:nvPr>
+        </p:nvSpPr>
+        <p:spPr/>
+        <p:txBody>
+          <a:bodyPr/>
+          <a:lstStyle/>
+          <a:p>
+            <a:fld id="{E30B86DD-1E4E-4BA9-90B9-02C65521F8DF}" type="slidenum">
+              <a:rPr lang="en-US" smtClean="0"/>
+              <a:t>11</a:t>
+            </a:fld>
+            <a:endParaRPr lang="en-US"/>
+          </a:p>
+        </p:txBody>
+      </p:sp>
+    </p:spTree>
+    <p:extLst>
+      <p:ext uri="{BB962C8B-B14F-4D97-AF65-F5344CB8AC3E}">
+        <p14:creationId xmlns:p14="http://schemas.microsoft.com/office/powerpoint/2010/main" val="1407168297"/>
+      </p:ext>
+    </p:extLst>
+  </p:cSld>
+  <p:clrMapOvr>
+    <a:masterClrMapping/>
+  </p:clrMapOvr>
+</p:notes>
+</file>
+
+<file path=ppt/notesSlides/notesSlide11.xml><?xml version="1.0" encoding="utf-8"?>
+<p:notes xmlns:a="http://schemas.openxmlformats.org/drawingml/2006/main" xmlns:r="http://schemas.openxmlformats.org/officeDocument/2006/relationships" xmlns:p="http://schemas.openxmlformats.org/presentationml/2006/main">
+  <p:cSld>
+    <p:spTree>
+      <p:nvGrpSpPr>
+        <p:cNvPr id="1" name=""/>
+        <p:cNvGrpSpPr/>
+        <p:nvPr/>
+      </p:nvGrpSpPr>
+      <p:grpSpPr>
+        <a:xfrm>
+          <a:off x="0" y="0"/>
+          <a:ext cx="0" cy="0"/>
+          <a:chOff x="0" y="0"/>
+          <a:chExt cx="0" cy="0"/>
+        </a:xfrm>
+      </p:grpSpPr>
+      <p:sp>
+        <p:nvSpPr>
+          <p:cNvPr id="2" name="Slide Image Placeholder 1"/>
+          <p:cNvSpPr>
+            <a:spLocks noGrp="1" noRot="1" noChangeAspect="1"/>
+          </p:cNvSpPr>
+          <p:nvPr>
+            <p:ph type="sldImg"/>
+          </p:nvPr>
+        </p:nvSpPr>
+        <p:spPr/>
+      </p:sp>
+      <p:sp>
+        <p:nvSpPr>
+          <p:cNvPr id="3" name="Notes Placeholder 2"/>
+          <p:cNvSpPr>
+            <a:spLocks noGrp="1"/>
+          </p:cNvSpPr>
+          <p:nvPr>
+            <p:ph type="body" idx="1"/>
+          </p:nvPr>
+        </p:nvSpPr>
+        <p:spPr/>
+        <p:txBody>
+          <a:bodyPr/>
+          <a:lstStyle/>
+          <a:p>
+            <a:r>
+              <a:rPr lang="en-US" dirty="0"/>
+              <a:t>Ethan</a:t>
+            </a:r>
+          </a:p>
+        </p:txBody>
+      </p:sp>
+      <p:sp>
+        <p:nvSpPr>
+          <p:cNvPr id="4" name="Slide Number Placeholder 3"/>
+          <p:cNvSpPr>
+            <a:spLocks noGrp="1"/>
+          </p:cNvSpPr>
+          <p:nvPr>
+            <p:ph type="sldNum" sz="quarter" idx="5"/>
+          </p:nvPr>
+        </p:nvSpPr>
+        <p:spPr/>
+        <p:txBody>
+          <a:bodyPr/>
+          <a:lstStyle/>
+          <a:p>
+            <a:fld id="{E30B86DD-1E4E-4BA9-90B9-02C65521F8DF}" type="slidenum">
+              <a:rPr lang="en-US" smtClean="0"/>
+              <a:t>12</a:t>
+            </a:fld>
+            <a:endParaRPr lang="en-US"/>
+          </a:p>
+        </p:txBody>
+      </p:sp>
+    </p:spTree>
+    <p:extLst>
+      <p:ext uri="{BB962C8B-B14F-4D97-AF65-F5344CB8AC3E}">
+        <p14:creationId xmlns:p14="http://schemas.microsoft.com/office/powerpoint/2010/main" val="688581299"/>
+      </p:ext>
+    </p:extLst>
+  </p:cSld>
+  <p:clrMapOvr>
+    <a:masterClrMapping/>
+  </p:clrMapOvr>
+</p:notes>
+</file>
+
+<file path=ppt/notesSlides/notesSlide12.xml><?xml version="1.0" encoding="utf-8"?>
+<p:notes xmlns:a="http://schemas.openxmlformats.org/drawingml/2006/main" xmlns:r="http://schemas.openxmlformats.org/officeDocument/2006/relationships" xmlns:p="http://schemas.openxmlformats.org/presentationml/2006/main">
+  <p:cSld>
+    <p:spTree>
+      <p:nvGrpSpPr>
+        <p:cNvPr id="1" name=""/>
+        <p:cNvGrpSpPr/>
+        <p:nvPr/>
+      </p:nvGrpSpPr>
+      <p:grpSpPr>
+        <a:xfrm>
+          <a:off x="0" y="0"/>
+          <a:ext cx="0" cy="0"/>
+          <a:chOff x="0" y="0"/>
+          <a:chExt cx="0" cy="0"/>
+        </a:xfrm>
+      </p:grpSpPr>
+      <p:sp>
+        <p:nvSpPr>
+          <p:cNvPr id="2" name="Slide Image Placeholder 1"/>
+          <p:cNvSpPr>
+            <a:spLocks noGrp="1" noRot="1" noChangeAspect="1"/>
+          </p:cNvSpPr>
+          <p:nvPr>
+            <p:ph type="sldImg"/>
+          </p:nvPr>
+        </p:nvSpPr>
+        <p:spPr/>
+      </p:sp>
+      <p:sp>
+        <p:nvSpPr>
+          <p:cNvPr id="3" name="Notes Placeholder 2"/>
+          <p:cNvSpPr>
+            <a:spLocks noGrp="1"/>
+          </p:cNvSpPr>
+          <p:nvPr>
+            <p:ph type="body" idx="1"/>
+          </p:nvPr>
+        </p:nvSpPr>
+        <p:spPr/>
+        <p:txBody>
+          <a:bodyPr/>
+          <a:lstStyle/>
+          <a:p>
+            <a:r>
+              <a:rPr lang="en-US" dirty="0"/>
+              <a:t>Ethan</a:t>
+            </a:r>
+          </a:p>
+        </p:txBody>
+      </p:sp>
+      <p:sp>
+        <p:nvSpPr>
+          <p:cNvPr id="4" name="Slide Number Placeholder 3"/>
+          <p:cNvSpPr>
+            <a:spLocks noGrp="1"/>
+          </p:cNvSpPr>
+          <p:nvPr>
+            <p:ph type="sldNum" sz="quarter" idx="5"/>
+          </p:nvPr>
+        </p:nvSpPr>
+        <p:spPr/>
+        <p:txBody>
+          <a:bodyPr/>
+          <a:lstStyle/>
+          <a:p>
+            <a:fld id="{E30B86DD-1E4E-4BA9-90B9-02C65521F8DF}" type="slidenum">
+              <a:rPr lang="en-US" smtClean="0"/>
+              <a:t>13</a:t>
+            </a:fld>
+            <a:endParaRPr lang="en-US"/>
+          </a:p>
+        </p:txBody>
+      </p:sp>
+    </p:spTree>
+    <p:extLst>
+      <p:ext uri="{BB962C8B-B14F-4D97-AF65-F5344CB8AC3E}">
+        <p14:creationId xmlns:p14="http://schemas.microsoft.com/office/powerpoint/2010/main" val="1537027200"/>
+      </p:ext>
+    </p:extLst>
+  </p:cSld>
+  <p:clrMapOvr>
+    <a:masterClrMapping/>
+  </p:clrMapOvr>
+</p:notes>
+</file>
+
+<file path=ppt/notesSlides/notesSlide13.xml><?xml version="1.0" encoding="utf-8"?>
+<p:notes xmlns:a="http://schemas.openxmlformats.org/drawingml/2006/main" xmlns:r="http://schemas.openxmlformats.org/officeDocument/2006/relationships" xmlns:p="http://schemas.openxmlformats.org/presentationml/2006/main">
+  <p:cSld>
+    <p:spTree>
+      <p:nvGrpSpPr>
+        <p:cNvPr id="1" name=""/>
+        <p:cNvGrpSpPr/>
+        <p:nvPr/>
+      </p:nvGrpSpPr>
+      <p:grpSpPr>
+        <a:xfrm>
+          <a:off x="0" y="0"/>
+          <a:ext cx="0" cy="0"/>
+          <a:chOff x="0" y="0"/>
+          <a:chExt cx="0" cy="0"/>
+        </a:xfrm>
+      </p:grpSpPr>
+      <p:sp>
+        <p:nvSpPr>
+          <p:cNvPr id="2" name="Slide Image Placeholder 1"/>
+          <p:cNvSpPr>
+            <a:spLocks noGrp="1" noRot="1" noChangeAspect="1"/>
+          </p:cNvSpPr>
+          <p:nvPr>
+            <p:ph type="sldImg"/>
+          </p:nvPr>
+        </p:nvSpPr>
+        <p:spPr/>
+      </p:sp>
+      <p:sp>
+        <p:nvSpPr>
+          <p:cNvPr id="3" name="Notes Placeholder 2"/>
+          <p:cNvSpPr>
+            <a:spLocks noGrp="1"/>
+          </p:cNvSpPr>
+          <p:nvPr>
+            <p:ph type="body" idx="1"/>
+          </p:nvPr>
+        </p:nvSpPr>
+        <p:spPr/>
+        <p:txBody>
+          <a:bodyPr/>
+          <a:lstStyle/>
+          <a:p>
+            <a:r>
+              <a:rPr lang="en-US" dirty="0"/>
+              <a:t>Ethan</a:t>
+            </a:r>
+          </a:p>
+        </p:txBody>
+      </p:sp>
+      <p:sp>
+        <p:nvSpPr>
+          <p:cNvPr id="4" name="Slide Number Placeholder 3"/>
+          <p:cNvSpPr>
+            <a:spLocks noGrp="1"/>
+          </p:cNvSpPr>
+          <p:nvPr>
+            <p:ph type="sldNum" sz="quarter" idx="5"/>
+          </p:nvPr>
+        </p:nvSpPr>
+        <p:spPr/>
+        <p:txBody>
+          <a:bodyPr/>
+          <a:lstStyle/>
+          <a:p>
+            <a:fld id="{E30B86DD-1E4E-4BA9-90B9-02C65521F8DF}" type="slidenum">
+              <a:rPr lang="en-US" smtClean="0"/>
+              <a:t>14</a:t>
+            </a:fld>
+            <a:endParaRPr lang="en-US"/>
+          </a:p>
+        </p:txBody>
+      </p:sp>
+    </p:spTree>
+    <p:extLst>
+      <p:ext uri="{BB962C8B-B14F-4D97-AF65-F5344CB8AC3E}">
+        <p14:creationId xmlns:p14="http://schemas.microsoft.com/office/powerpoint/2010/main" val="2869556612"/>
+      </p:ext>
+    </p:extLst>
+  </p:cSld>
+  <p:clrMapOvr>
+    <a:masterClrMapping/>
+  </p:clrMapOvr>
+</p:notes>
+</file>
+
+<file path=ppt/notesSlides/notesSlide2.xml><?xml version="1.0" encoding="utf-8"?>
+<p:notes xmlns:a="http://schemas.openxmlformats.org/drawingml/2006/main" xmlns:r="http://schemas.openxmlformats.org/officeDocument/2006/relationships" xmlns:p="http://schemas.openxmlformats.org/presentationml/2006/main">
+  <p:cSld>
+    <p:spTree>
+      <p:nvGrpSpPr>
+        <p:cNvPr id="1" name=""/>
+        <p:cNvGrpSpPr/>
+        <p:nvPr/>
+      </p:nvGrpSpPr>
+      <p:grpSpPr>
+        <a:xfrm>
+          <a:off x="0" y="0"/>
+          <a:ext cx="0" cy="0"/>
+          <a:chOff x="0" y="0"/>
+          <a:chExt cx="0" cy="0"/>
+        </a:xfrm>
+      </p:grpSpPr>
+      <p:sp>
+        <p:nvSpPr>
+          <p:cNvPr id="2" name="Slide Image Placeholder 1"/>
+          <p:cNvSpPr>
+            <a:spLocks noGrp="1" noRot="1" noChangeAspect="1"/>
+          </p:cNvSpPr>
+          <p:nvPr>
+            <p:ph type="sldImg"/>
+          </p:nvPr>
+        </p:nvSpPr>
+        <p:spPr/>
+      </p:sp>
+      <p:sp>
+        <p:nvSpPr>
+          <p:cNvPr id="3" name="Notes Placeholder 2"/>
+          <p:cNvSpPr>
+            <a:spLocks noGrp="1"/>
+          </p:cNvSpPr>
+          <p:nvPr>
+            <p:ph type="body" idx="1"/>
+          </p:nvPr>
+        </p:nvSpPr>
+        <p:spPr/>
+        <p:txBody>
+          <a:bodyPr/>
+          <a:lstStyle/>
+          <a:p>
+            <a:r>
+              <a:rPr lang="en-US" dirty="0"/>
+              <a:t>Tannyr</a:t>
+            </a:r>
+          </a:p>
+        </p:txBody>
+      </p:sp>
+      <p:sp>
+        <p:nvSpPr>
+          <p:cNvPr id="4" name="Slide Number Placeholder 3"/>
+          <p:cNvSpPr>
+            <a:spLocks noGrp="1"/>
+          </p:cNvSpPr>
+          <p:nvPr>
+            <p:ph type="sldNum" sz="quarter" idx="5"/>
+          </p:nvPr>
+        </p:nvSpPr>
+        <p:spPr/>
+        <p:txBody>
+          <a:bodyPr/>
+          <a:lstStyle/>
+          <a:p>
+            <a:fld id="{E30B86DD-1E4E-4BA9-90B9-02C65521F8DF}" type="slidenum">
+              <a:rPr lang="en-US" smtClean="0"/>
+              <a:t>3</a:t>
+            </a:fld>
+            <a:endParaRPr lang="en-US"/>
+          </a:p>
+        </p:txBody>
+      </p:sp>
+    </p:spTree>
+    <p:extLst>
+      <p:ext uri="{BB962C8B-B14F-4D97-AF65-F5344CB8AC3E}">
+        <p14:creationId xmlns:p14="http://schemas.microsoft.com/office/powerpoint/2010/main" val="2827476655"/>
+      </p:ext>
+    </p:extLst>
+  </p:cSld>
+  <p:clrMapOvr>
+    <a:masterClrMapping/>
+  </p:clrMapOvr>
+</p:notes>
+</file>
+
+<file path=ppt/notesSlides/notesSlide3.xml><?xml version="1.0" encoding="utf-8"?>
+<p:notes xmlns:a="http://schemas.openxmlformats.org/drawingml/2006/main" xmlns:r="http://schemas.openxmlformats.org/officeDocument/2006/relationships" xmlns:p="http://schemas.openxmlformats.org/presentationml/2006/main">
+  <p:cSld>
+    <p:spTree>
+      <p:nvGrpSpPr>
+        <p:cNvPr id="1" name=""/>
+        <p:cNvGrpSpPr/>
+        <p:nvPr/>
+      </p:nvGrpSpPr>
+      <p:grpSpPr>
+        <a:xfrm>
+          <a:off x="0" y="0"/>
+          <a:ext cx="0" cy="0"/>
+          <a:chOff x="0" y="0"/>
+          <a:chExt cx="0" cy="0"/>
+        </a:xfrm>
+      </p:grpSpPr>
+      <p:sp>
+        <p:nvSpPr>
+          <p:cNvPr id="2" name="Slide Image Placeholder 1"/>
+          <p:cNvSpPr>
+            <a:spLocks noGrp="1" noRot="1" noChangeAspect="1"/>
+          </p:cNvSpPr>
+          <p:nvPr>
+            <p:ph type="sldImg"/>
+          </p:nvPr>
+        </p:nvSpPr>
+        <p:spPr/>
+      </p:sp>
+      <p:sp>
+        <p:nvSpPr>
+          <p:cNvPr id="3" name="Notes Placeholder 2"/>
+          <p:cNvSpPr>
+            <a:spLocks noGrp="1"/>
+          </p:cNvSpPr>
+          <p:nvPr>
+            <p:ph type="body" idx="1"/>
+          </p:nvPr>
+        </p:nvSpPr>
+        <p:spPr/>
+        <p:txBody>
+          <a:bodyPr/>
+          <a:lstStyle/>
+          <a:p>
+            <a:r>
+              <a:rPr lang="en-US" dirty="0"/>
+              <a:t>Tannyr</a:t>
+            </a:r>
+          </a:p>
+        </p:txBody>
+      </p:sp>
+      <p:sp>
+        <p:nvSpPr>
+          <p:cNvPr id="4" name="Slide Number Placeholder 3"/>
+          <p:cNvSpPr>
+            <a:spLocks noGrp="1"/>
+          </p:cNvSpPr>
+          <p:nvPr>
+            <p:ph type="sldNum" sz="quarter" idx="5"/>
+          </p:nvPr>
+        </p:nvSpPr>
+        <p:spPr/>
+        <p:txBody>
+          <a:bodyPr/>
+          <a:lstStyle/>
+          <a:p>
+            <a:fld id="{E30B86DD-1E4E-4BA9-90B9-02C65521F8DF}" type="slidenum">
+              <a:rPr lang="en-US" smtClean="0"/>
+              <a:t>4</a:t>
+            </a:fld>
+            <a:endParaRPr lang="en-US"/>
+          </a:p>
+        </p:txBody>
+      </p:sp>
+    </p:spTree>
+    <p:extLst>
+      <p:ext uri="{BB962C8B-B14F-4D97-AF65-F5344CB8AC3E}">
+        <p14:creationId xmlns:p14="http://schemas.microsoft.com/office/powerpoint/2010/main" val="1195056078"/>
+      </p:ext>
+    </p:extLst>
+  </p:cSld>
+  <p:clrMapOvr>
+    <a:masterClrMapping/>
+  </p:clrMapOvr>
+</p:notes>
+</file>
+
+<file path=ppt/notesSlides/notesSlide4.xml><?xml version="1.0" encoding="utf-8"?>
+<p:notes xmlns:a="http://schemas.openxmlformats.org/drawingml/2006/main" xmlns:r="http://schemas.openxmlformats.org/officeDocument/2006/relationships" xmlns:p="http://schemas.openxmlformats.org/presentationml/2006/main">
+  <p:cSld>
+    <p:spTree>
+      <p:nvGrpSpPr>
+        <p:cNvPr id="1" name=""/>
+        <p:cNvGrpSpPr/>
+        <p:nvPr/>
+      </p:nvGrpSpPr>
+      <p:grpSpPr>
+        <a:xfrm>
+          <a:off x="0" y="0"/>
+          <a:ext cx="0" cy="0"/>
+          <a:chOff x="0" y="0"/>
+          <a:chExt cx="0" cy="0"/>
+        </a:xfrm>
+      </p:grpSpPr>
+      <p:sp>
+        <p:nvSpPr>
+          <p:cNvPr id="2" name="Slide Image Placeholder 1"/>
+          <p:cNvSpPr>
+            <a:spLocks noGrp="1" noRot="1" noChangeAspect="1"/>
+          </p:cNvSpPr>
+          <p:nvPr>
+            <p:ph type="sldImg"/>
+          </p:nvPr>
+        </p:nvSpPr>
+        <p:spPr/>
+      </p:sp>
+      <p:sp>
+        <p:nvSpPr>
+          <p:cNvPr id="3" name="Notes Placeholder 2"/>
+          <p:cNvSpPr>
+            <a:spLocks noGrp="1"/>
+          </p:cNvSpPr>
+          <p:nvPr>
+            <p:ph type="body" idx="1"/>
+          </p:nvPr>
+        </p:nvSpPr>
+        <p:spPr/>
+        <p:txBody>
+          <a:bodyPr/>
+          <a:lstStyle/>
+          <a:p>
+            <a:r>
+              <a:rPr lang="en-US" dirty="0"/>
+              <a:t>Tannyr</a:t>
+            </a:r>
+          </a:p>
+        </p:txBody>
+      </p:sp>
+      <p:sp>
+        <p:nvSpPr>
+          <p:cNvPr id="4" name="Slide Number Placeholder 3"/>
+          <p:cNvSpPr>
+            <a:spLocks noGrp="1"/>
+          </p:cNvSpPr>
+          <p:nvPr>
+            <p:ph type="sldNum" sz="quarter" idx="5"/>
+          </p:nvPr>
+        </p:nvSpPr>
+        <p:spPr/>
+        <p:txBody>
+          <a:bodyPr/>
+          <a:lstStyle/>
+          <a:p>
+            <a:fld id="{E30B86DD-1E4E-4BA9-90B9-02C65521F8DF}" type="slidenum">
+              <a:rPr lang="en-US" smtClean="0"/>
+              <a:t>5</a:t>
+            </a:fld>
+            <a:endParaRPr lang="en-US"/>
+          </a:p>
+        </p:txBody>
+      </p:sp>
+    </p:spTree>
+    <p:extLst>
+      <p:ext uri="{BB962C8B-B14F-4D97-AF65-F5344CB8AC3E}">
+        <p14:creationId xmlns:p14="http://schemas.microsoft.com/office/powerpoint/2010/main" val="2956292897"/>
+      </p:ext>
+    </p:extLst>
+  </p:cSld>
+  <p:clrMapOvr>
+    <a:masterClrMapping/>
+  </p:clrMapOvr>
+</p:notes>
+</file>
+
+<file path=ppt/notesSlides/notesSlide5.xml><?xml version="1.0" encoding="utf-8"?>
+<p:notes xmlns:a="http://schemas.openxmlformats.org/drawingml/2006/main" xmlns:r="http://schemas.openxmlformats.org/officeDocument/2006/relationships" xmlns:p="http://schemas.openxmlformats.org/presentationml/2006/main">
+  <p:cSld>
+    <p:spTree>
+      <p:nvGrpSpPr>
+        <p:cNvPr id="1" name=""/>
+        <p:cNvGrpSpPr/>
+        <p:nvPr/>
+      </p:nvGrpSpPr>
+      <p:grpSpPr>
+        <a:xfrm>
+          <a:off x="0" y="0"/>
+          <a:ext cx="0" cy="0"/>
+          <a:chOff x="0" y="0"/>
+          <a:chExt cx="0" cy="0"/>
+        </a:xfrm>
+      </p:grpSpPr>
+      <p:sp>
+        <p:nvSpPr>
+          <p:cNvPr id="2" name="Slide Image Placeholder 1"/>
+          <p:cNvSpPr>
+            <a:spLocks noGrp="1" noRot="1" noChangeAspect="1"/>
+          </p:cNvSpPr>
+          <p:nvPr>
+            <p:ph type="sldImg"/>
+          </p:nvPr>
+        </p:nvSpPr>
+        <p:spPr/>
+      </p:sp>
+      <p:sp>
+        <p:nvSpPr>
+          <p:cNvPr id="3" name="Notes Placeholder 2"/>
+          <p:cNvSpPr>
+            <a:spLocks noGrp="1"/>
+          </p:cNvSpPr>
+          <p:nvPr>
+            <p:ph type="body" idx="1"/>
+          </p:nvPr>
+        </p:nvSpPr>
+        <p:spPr/>
+        <p:txBody>
+          <a:bodyPr/>
+          <a:lstStyle/>
+          <a:p>
+            <a:r>
+              <a:rPr lang="en-US" dirty="0"/>
+              <a:t>Nathan</a:t>
+            </a:r>
+          </a:p>
+        </p:txBody>
+      </p:sp>
+      <p:sp>
+        <p:nvSpPr>
+          <p:cNvPr id="4" name="Slide Number Placeholder 3"/>
+          <p:cNvSpPr>
+            <a:spLocks noGrp="1"/>
+          </p:cNvSpPr>
+          <p:nvPr>
+            <p:ph type="sldNum" sz="quarter" idx="5"/>
+          </p:nvPr>
+        </p:nvSpPr>
+        <p:spPr/>
+        <p:txBody>
+          <a:bodyPr/>
+          <a:lstStyle/>
+          <a:p>
+            <a:fld id="{E30B86DD-1E4E-4BA9-90B9-02C65521F8DF}" type="slidenum">
+              <a:rPr lang="en-US" smtClean="0"/>
+              <a:t>6</a:t>
+            </a:fld>
+            <a:endParaRPr lang="en-US"/>
+          </a:p>
+        </p:txBody>
+      </p:sp>
+    </p:spTree>
+    <p:extLst>
+      <p:ext uri="{BB962C8B-B14F-4D97-AF65-F5344CB8AC3E}">
+        <p14:creationId xmlns:p14="http://schemas.microsoft.com/office/powerpoint/2010/main" val="1918727849"/>
+      </p:ext>
+    </p:extLst>
+  </p:cSld>
+  <p:clrMapOvr>
+    <a:masterClrMapping/>
+  </p:clrMapOvr>
+</p:notes>
+</file>
+
+<file path=ppt/notesSlides/notesSlide6.xml><?xml version="1.0" encoding="utf-8"?>
+<p:notes xmlns:a="http://schemas.openxmlformats.org/drawingml/2006/main" xmlns:r="http://schemas.openxmlformats.org/officeDocument/2006/relationships" xmlns:p="http://schemas.openxmlformats.org/presentationml/2006/main">
+  <p:cSld>
+    <p:spTree>
+      <p:nvGrpSpPr>
+        <p:cNvPr id="1" name=""/>
+        <p:cNvGrpSpPr/>
+        <p:nvPr/>
+      </p:nvGrpSpPr>
+      <p:grpSpPr>
+        <a:xfrm>
+          <a:off x="0" y="0"/>
+          <a:ext cx="0" cy="0"/>
+          <a:chOff x="0" y="0"/>
+          <a:chExt cx="0" cy="0"/>
+        </a:xfrm>
+      </p:grpSpPr>
+      <p:sp>
+        <p:nvSpPr>
+          <p:cNvPr id="2" name="Slide Image Placeholder 1"/>
+          <p:cNvSpPr>
+            <a:spLocks noGrp="1" noRot="1" noChangeAspect="1"/>
+          </p:cNvSpPr>
+          <p:nvPr>
+            <p:ph type="sldImg"/>
+          </p:nvPr>
+        </p:nvSpPr>
+        <p:spPr/>
+      </p:sp>
+      <p:sp>
+        <p:nvSpPr>
+          <p:cNvPr id="3" name="Notes Placeholder 2"/>
+          <p:cNvSpPr>
+            <a:spLocks noGrp="1"/>
+          </p:cNvSpPr>
+          <p:nvPr>
+            <p:ph type="body" idx="1"/>
+          </p:nvPr>
+        </p:nvSpPr>
+        <p:spPr/>
+        <p:txBody>
+          <a:bodyPr/>
+          <a:lstStyle/>
+          <a:p>
+            <a:r>
+              <a:rPr lang="en-US" dirty="0"/>
+              <a:t>Nathan</a:t>
+            </a:r>
+          </a:p>
+        </p:txBody>
+      </p:sp>
+      <p:sp>
+        <p:nvSpPr>
+          <p:cNvPr id="4" name="Slide Number Placeholder 3"/>
+          <p:cNvSpPr>
+            <a:spLocks noGrp="1"/>
+          </p:cNvSpPr>
+          <p:nvPr>
+            <p:ph type="sldNum" sz="quarter" idx="5"/>
+          </p:nvPr>
+        </p:nvSpPr>
+        <p:spPr/>
+        <p:txBody>
+          <a:bodyPr/>
+          <a:lstStyle/>
+          <a:p>
+            <a:fld id="{E30B86DD-1E4E-4BA9-90B9-02C65521F8DF}" type="slidenum">
+              <a:rPr lang="en-US" smtClean="0"/>
+              <a:t>7</a:t>
+            </a:fld>
+            <a:endParaRPr lang="en-US"/>
+          </a:p>
+        </p:txBody>
+      </p:sp>
+    </p:spTree>
+    <p:extLst>
+      <p:ext uri="{BB962C8B-B14F-4D97-AF65-F5344CB8AC3E}">
+        <p14:creationId xmlns:p14="http://schemas.microsoft.com/office/powerpoint/2010/main" val="3885815677"/>
+      </p:ext>
+    </p:extLst>
+  </p:cSld>
+  <p:clrMapOvr>
+    <a:masterClrMapping/>
+  </p:clrMapOvr>
+</p:notes>
+</file>
+
+<file path=ppt/notesSlides/notesSlide7.xml><?xml version="1.0" encoding="utf-8"?>
+<p:notes xmlns:a="http://schemas.openxmlformats.org/drawingml/2006/main" xmlns:r="http://schemas.openxmlformats.org/officeDocument/2006/relationships" xmlns:p="http://schemas.openxmlformats.org/presentationml/2006/main">
+  <p:cSld>
+    <p:spTree>
+      <p:nvGrpSpPr>
+        <p:cNvPr id="1" name=""/>
+        <p:cNvGrpSpPr/>
+        <p:nvPr/>
+      </p:nvGrpSpPr>
+      <p:grpSpPr>
+        <a:xfrm>
+          <a:off x="0" y="0"/>
+          <a:ext cx="0" cy="0"/>
+          <a:chOff x="0" y="0"/>
+          <a:chExt cx="0" cy="0"/>
+        </a:xfrm>
+      </p:grpSpPr>
+      <p:sp>
+        <p:nvSpPr>
+          <p:cNvPr id="2" name="Slide Image Placeholder 1"/>
+          <p:cNvSpPr>
+            <a:spLocks noGrp="1" noRot="1" noChangeAspect="1"/>
+          </p:cNvSpPr>
+          <p:nvPr>
+            <p:ph type="sldImg"/>
+          </p:nvPr>
+        </p:nvSpPr>
+        <p:spPr/>
+      </p:sp>
+      <p:sp>
+        <p:nvSpPr>
+          <p:cNvPr id="3" name="Notes Placeholder 2"/>
+          <p:cNvSpPr>
+            <a:spLocks noGrp="1"/>
+          </p:cNvSpPr>
+          <p:nvPr>
+            <p:ph type="body" idx="1"/>
+          </p:nvPr>
+        </p:nvSpPr>
+        <p:spPr/>
+        <p:txBody>
+          <a:bodyPr/>
+          <a:lstStyle/>
+          <a:p>
+            <a:r>
+              <a:rPr lang="en-US" dirty="0"/>
+              <a:t>Nathan</a:t>
+            </a:r>
+          </a:p>
+        </p:txBody>
+      </p:sp>
+      <p:sp>
+        <p:nvSpPr>
+          <p:cNvPr id="4" name="Slide Number Placeholder 3"/>
+          <p:cNvSpPr>
+            <a:spLocks noGrp="1"/>
+          </p:cNvSpPr>
+          <p:nvPr>
+            <p:ph type="sldNum" sz="quarter" idx="5"/>
+          </p:nvPr>
+        </p:nvSpPr>
+        <p:spPr/>
+        <p:txBody>
+          <a:bodyPr/>
+          <a:lstStyle/>
+          <a:p>
+            <a:fld id="{E30B86DD-1E4E-4BA9-90B9-02C65521F8DF}" type="slidenum">
+              <a:rPr lang="en-US" smtClean="0"/>
+              <a:t>8</a:t>
+            </a:fld>
+            <a:endParaRPr lang="en-US"/>
+          </a:p>
+        </p:txBody>
+      </p:sp>
+    </p:spTree>
+    <p:extLst>
+      <p:ext uri="{BB962C8B-B14F-4D97-AF65-F5344CB8AC3E}">
+        <p14:creationId xmlns:p14="http://schemas.microsoft.com/office/powerpoint/2010/main" val="1902545171"/>
+      </p:ext>
+    </p:extLst>
+  </p:cSld>
+  <p:clrMapOvr>
+    <a:masterClrMapping/>
+  </p:clrMapOvr>
+</p:notes>
+</file>
+
+<file path=ppt/notesSlides/notesSlide8.xml><?xml version="1.0" encoding="utf-8"?>
+<p:notes xmlns:a="http://schemas.openxmlformats.org/drawingml/2006/main" xmlns:r="http://schemas.openxmlformats.org/officeDocument/2006/relationships" xmlns:p="http://schemas.openxmlformats.org/presentationml/2006/main">
+  <p:cSld>
+    <p:spTree>
+      <p:nvGrpSpPr>
+        <p:cNvPr id="1" name=""/>
+        <p:cNvGrpSpPr/>
+        <p:nvPr/>
+      </p:nvGrpSpPr>
+      <p:grpSpPr>
+        <a:xfrm>
+          <a:off x="0" y="0"/>
+          <a:ext cx="0" cy="0"/>
+          <a:chOff x="0" y="0"/>
+          <a:chExt cx="0" cy="0"/>
+        </a:xfrm>
+      </p:grpSpPr>
+      <p:sp>
+        <p:nvSpPr>
+          <p:cNvPr id="2" name="Slide Image Placeholder 1"/>
+          <p:cNvSpPr>
+            <a:spLocks noGrp="1" noRot="1" noChangeAspect="1"/>
+          </p:cNvSpPr>
+          <p:nvPr>
+            <p:ph type="sldImg"/>
+          </p:nvPr>
+        </p:nvSpPr>
+        <p:spPr/>
+      </p:sp>
+      <p:sp>
+        <p:nvSpPr>
+          <p:cNvPr id="3" name="Notes Placeholder 2"/>
+          <p:cNvSpPr>
+            <a:spLocks noGrp="1"/>
+          </p:cNvSpPr>
+          <p:nvPr>
+            <p:ph type="body" idx="1"/>
+          </p:nvPr>
+        </p:nvSpPr>
+        <p:spPr/>
+        <p:txBody>
+          <a:bodyPr/>
+          <a:lstStyle/>
+          <a:p>
+            <a:r>
+              <a:rPr lang="en-US" dirty="0"/>
+              <a:t>Nathan</a:t>
+            </a:r>
+          </a:p>
+        </p:txBody>
+      </p:sp>
+      <p:sp>
+        <p:nvSpPr>
+          <p:cNvPr id="4" name="Slide Number Placeholder 3"/>
+          <p:cNvSpPr>
+            <a:spLocks noGrp="1"/>
+          </p:cNvSpPr>
+          <p:nvPr>
+            <p:ph type="sldNum" sz="quarter" idx="5"/>
+          </p:nvPr>
+        </p:nvSpPr>
+        <p:spPr/>
+        <p:txBody>
+          <a:bodyPr/>
+          <a:lstStyle/>
+          <a:p>
+            <a:fld id="{E30B86DD-1E4E-4BA9-90B9-02C65521F8DF}" type="slidenum">
+              <a:rPr lang="en-US" smtClean="0"/>
+              <a:t>9</a:t>
+            </a:fld>
+            <a:endParaRPr lang="en-US"/>
+          </a:p>
+        </p:txBody>
+      </p:sp>
+    </p:spTree>
+    <p:extLst>
+      <p:ext uri="{BB962C8B-B14F-4D97-AF65-F5344CB8AC3E}">
+        <p14:creationId xmlns:p14="http://schemas.microsoft.com/office/powerpoint/2010/main" val="2149630475"/>
+      </p:ext>
+    </p:extLst>
+  </p:cSld>
+  <p:clrMapOvr>
+    <a:masterClrMapping/>
+  </p:clrMapOvr>
+</p:notes>
+</file>
+
+<file path=ppt/notesSlides/notesSlide9.xml><?xml version="1.0" encoding="utf-8"?>
+<p:notes xmlns:a="http://schemas.openxmlformats.org/drawingml/2006/main" xmlns:r="http://schemas.openxmlformats.org/officeDocument/2006/relationships" xmlns:p="http://schemas.openxmlformats.org/presentationml/2006/main">
+  <p:cSld>
+    <p:spTree>
+      <p:nvGrpSpPr>
+        <p:cNvPr id="1" name=""/>
+        <p:cNvGrpSpPr/>
+        <p:nvPr/>
+      </p:nvGrpSpPr>
+      <p:grpSpPr>
+        <a:xfrm>
+          <a:off x="0" y="0"/>
+          <a:ext cx="0" cy="0"/>
+          <a:chOff x="0" y="0"/>
+          <a:chExt cx="0" cy="0"/>
+        </a:xfrm>
+      </p:grpSpPr>
+      <p:sp>
+        <p:nvSpPr>
+          <p:cNvPr id="2" name="Slide Image Placeholder 1"/>
+          <p:cNvSpPr>
+            <a:spLocks noGrp="1" noRot="1" noChangeAspect="1"/>
+          </p:cNvSpPr>
+          <p:nvPr>
+            <p:ph type="sldImg"/>
+          </p:nvPr>
+        </p:nvSpPr>
+        <p:spPr/>
+      </p:sp>
+      <p:sp>
+        <p:nvSpPr>
+          <p:cNvPr id="3" name="Notes Placeholder 2"/>
+          <p:cNvSpPr>
+            <a:spLocks noGrp="1"/>
+          </p:cNvSpPr>
+          <p:nvPr>
+            <p:ph type="body" idx="1"/>
+          </p:nvPr>
+        </p:nvSpPr>
+        <p:spPr/>
+        <p:txBody>
+          <a:bodyPr/>
+          <a:lstStyle/>
+          <a:p>
+            <a:r>
+              <a:rPr lang="en-US" dirty="0"/>
+              <a:t>Gannon</a:t>
+            </a:r>
+          </a:p>
+        </p:txBody>
+      </p:sp>
+      <p:sp>
+        <p:nvSpPr>
+          <p:cNvPr id="4" name="Slide Number Placeholder 3"/>
+          <p:cNvSpPr>
+            <a:spLocks noGrp="1"/>
+          </p:cNvSpPr>
+          <p:nvPr>
+            <p:ph type="sldNum" sz="quarter" idx="5"/>
+          </p:nvPr>
+        </p:nvSpPr>
+        <p:spPr/>
+        <p:txBody>
+          <a:bodyPr/>
+          <a:lstStyle/>
+          <a:p>
+            <a:fld id="{E30B86DD-1E4E-4BA9-90B9-02C65521F8DF}" type="slidenum">
+              <a:rPr lang="en-US" smtClean="0"/>
+              <a:t>10</a:t>
+            </a:fld>
+            <a:endParaRPr lang="en-US"/>
+          </a:p>
+        </p:txBody>
+      </p:sp>
+    </p:spTree>
+    <p:extLst>
+      <p:ext uri="{BB962C8B-B14F-4D97-AF65-F5344CB8AC3E}">
+        <p14:creationId xmlns:p14="http://schemas.microsoft.com/office/powerpoint/2010/main" val="3112269996"/>
+      </p:ext>
+    </p:extLst>
+  </p:cSld>
+  <p:clrMapOvr>
+    <a:masterClrMapping/>
+  </p:clrMapOvr>
+</p:notes>
 </file>
 
 <file path=ppt/slideLayouts/slideLayout1.xml><?xml version="1.0" encoding="utf-8"?>
@@ -4248,7 +5811,7 @@
           </p:nvPr>
         </p:nvPicPr>
         <p:blipFill>
-          <a:blip r:embed="rId2">
+          <a:blip r:embed="rId3">
             <a:extLst>
               <a:ext uri="{28A0092B-C50C-407E-A947-70E740481C1C}">
                 <a14:useLocalDpi xmlns:a14="http://schemas.microsoft.com/office/drawing/2010/main" val="0"/>
@@ -4261,7 +5824,7 @@
         </p:blipFill>
         <p:spPr>
           <a:xfrm>
-            <a:off x="3576554" y="1337187"/>
+            <a:off x="4776090" y="851156"/>
             <a:ext cx="5038892" cy="5155688"/>
           </a:xfrm>
         </p:spPr>
@@ -4301,7 +5864,7 @@
           <p:cNvPr id="2" name="Title 1">
             <a:extLst>
               <a:ext uri="{FF2B5EF4-FFF2-40B4-BE49-F238E27FC236}">
-                <a16:creationId xmlns:a16="http://schemas.microsoft.com/office/drawing/2014/main" id="{05A2DF96-20C7-747C-7E82-DC4FE967DFDF}"/>
+                <a16:creationId xmlns:a16="http://schemas.microsoft.com/office/drawing/2014/main" id="{B67A333E-5C75-96D2-6959-292C687D5673}"/>
               </a:ext>
             </a:extLst>
           </p:cNvPr>
@@ -4319,7 +5882,7 @@
           <a:p>
             <a:r>
               <a:rPr lang="en-US" dirty="0"/>
-              <a:t>Interfaces ?</a:t>
+              <a:t>Cost/Budget</a:t>
             </a:r>
           </a:p>
         </p:txBody>
@@ -4329,7 +5892,7 @@
           <p:cNvPr id="3" name="Content Placeholder 2">
             <a:extLst>
               <a:ext uri="{FF2B5EF4-FFF2-40B4-BE49-F238E27FC236}">
-                <a16:creationId xmlns:a16="http://schemas.microsoft.com/office/drawing/2014/main" id="{3839CEE8-F836-F00E-4173-836D6B3D3F54}"/>
+                <a16:creationId xmlns:a16="http://schemas.microsoft.com/office/drawing/2014/main" id="{0FF5FD38-A45D-7408-58B5-6DAAD75B63BB}"/>
               </a:ext>
             </a:extLst>
           </p:cNvPr>
@@ -4353,10 +5916,11 @@
                   </a:schemeClr>
                 </a:solidFill>
               </a:rPr>
-              <a:t>USB – Used for taking </a:t>
+              <a:t>Plan for two board revisions </a:t>
             </a:r>
           </a:p>
           <a:p>
+            <a:pPr lvl="1"/>
             <a:r>
               <a:rPr lang="en-US" dirty="0">
                 <a:solidFill>
@@ -4365,10 +5929,11 @@
                   </a:schemeClr>
                 </a:solidFill>
               </a:rPr>
-              <a:t>Microcontroller – ESP32 built in transceiver </a:t>
+              <a:t>First one cheaper with buttons for debugging.</a:t>
             </a:r>
           </a:p>
           <a:p>
+            <a:pPr lvl="1"/>
             <a:r>
               <a:rPr lang="en-US" dirty="0">
                 <a:solidFill>
@@ -4377,7 +5942,83 @@
                   </a:schemeClr>
                 </a:solidFill>
               </a:rPr>
-              <a:t>Sensors – SPI and I2C</a:t>
+              <a:t>Second revision to improve design and fly.</a:t>
+            </a:r>
+          </a:p>
+          <a:p>
+            <a:r>
+              <a:rPr lang="en-US" dirty="0">
+                <a:solidFill>
+                  <a:schemeClr val="accent5">
+                    <a:lumMod val="75000"/>
+                  </a:schemeClr>
+                </a:solidFill>
+              </a:rPr>
+              <a:t>First board Revision</a:t>
+            </a:r>
+          </a:p>
+          <a:p>
+            <a:pPr lvl="1"/>
+            <a:r>
+              <a:rPr lang="en-US" dirty="0">
+                <a:solidFill>
+                  <a:schemeClr val="accent5">
+                    <a:lumMod val="75000"/>
+                  </a:schemeClr>
+                </a:solidFill>
+              </a:rPr>
+              <a:t>PCB - $4.00</a:t>
+            </a:r>
+          </a:p>
+          <a:p>
+            <a:pPr lvl="1"/>
+            <a:r>
+              <a:rPr lang="en-US" dirty="0">
+                <a:solidFill>
+                  <a:schemeClr val="accent5">
+                    <a:lumMod val="75000"/>
+                  </a:schemeClr>
+                </a:solidFill>
+              </a:rPr>
+              <a:t>Temperature Sensor - $5.00</a:t>
+            </a:r>
+          </a:p>
+          <a:p>
+            <a:pPr lvl="1"/>
+            <a:r>
+              <a:rPr lang="en-US" dirty="0">
+                <a:solidFill>
+                  <a:schemeClr val="accent5">
+                    <a:lumMod val="75000"/>
+                  </a:schemeClr>
+                </a:solidFill>
+              </a:rPr>
+              <a:t>Microcontroller - $10.00</a:t>
+            </a:r>
+          </a:p>
+          <a:p>
+            <a:pPr lvl="1"/>
+            <a:r>
+              <a:rPr lang="en-US" dirty="0">
+                <a:solidFill>
+                  <a:schemeClr val="accent5">
+                    <a:lumMod val="75000"/>
+                  </a:schemeClr>
+                </a:solidFill>
+              </a:rPr>
+              <a:t>IMU - $30.00</a:t>
+            </a:r>
+          </a:p>
+          <a:p>
+            <a:r>
+              <a:rPr lang="en-US" dirty="0">
+                <a:solidFill>
+                  <a:schemeClr val="accent5">
+                    <a:lumMod val="75000"/>
+                  </a:schemeClr>
+                </a:solidFill>
+              </a:rPr>
+              <a:t>Total for first revision: $49.00</a:t>
             </a:r>
           </a:p>
         </p:txBody>
@@ -4385,7 +6026,7 @@
     </p:spTree>
     <p:extLst>
       <p:ext uri="{BB962C8B-B14F-4D97-AF65-F5344CB8AC3E}">
-        <p14:creationId xmlns:p14="http://schemas.microsoft.com/office/powerpoint/2010/main" val="1227231928"/>
+        <p14:creationId xmlns:p14="http://schemas.microsoft.com/office/powerpoint/2010/main" val="982414475"/>
       </p:ext>
     </p:extLst>
   </p:cSld>
@@ -4417,7 +6058,7 @@
           <p:cNvPr id="2" name="Title 1">
             <a:extLst>
               <a:ext uri="{FF2B5EF4-FFF2-40B4-BE49-F238E27FC236}">
-                <a16:creationId xmlns:a16="http://schemas.microsoft.com/office/drawing/2014/main" id="{B67A333E-5C75-96D2-6959-292C687D5673}"/>
+                <a16:creationId xmlns:a16="http://schemas.microsoft.com/office/drawing/2014/main" id="{65FEEB9D-C258-6356-E64F-0226C0C1E2D9}"/>
               </a:ext>
             </a:extLst>
           </p:cNvPr>
@@ -4435,7 +6076,7 @@
           <a:p>
             <a:r>
               <a:rPr lang="en-US" dirty="0"/>
-              <a:t>Cost/Budget</a:t>
+              <a:t>Feasibility Assessment/Risks</a:t>
             </a:r>
           </a:p>
         </p:txBody>
@@ -4445,7 +6086,7 @@
           <p:cNvPr id="3" name="Content Placeholder 2">
             <a:extLst>
               <a:ext uri="{FF2B5EF4-FFF2-40B4-BE49-F238E27FC236}">
-                <a16:creationId xmlns:a16="http://schemas.microsoft.com/office/drawing/2014/main" id="{0FF5FD38-A45D-7408-58B5-6DAAD75B63BB}"/>
+                <a16:creationId xmlns:a16="http://schemas.microsoft.com/office/drawing/2014/main" id="{8A3AF3FC-0E98-B368-78EC-704185C5ED60}"/>
               </a:ext>
             </a:extLst>
           </p:cNvPr>
@@ -4458,7 +6099,9 @@
         </p:nvSpPr>
         <p:spPr/>
         <p:txBody>
-          <a:bodyPr/>
+          <a:bodyPr>
+            <a:normAutofit lnSpcReduction="10000"/>
+          </a:bodyPr>
           <a:lstStyle/>
           <a:p>
             <a:r>
@@ -4469,7 +6112,7 @@
                   </a:schemeClr>
                 </a:solidFill>
               </a:rPr>
-              <a:t>Plan for two board revisions </a:t>
+              <a:t>Feasibility</a:t>
             </a:r>
           </a:p>
           <a:p>
@@ -4482,7 +6125,7 @@
                   </a:schemeClr>
                 </a:solidFill>
               </a:rPr>
-              <a:t>First one cheaper with buttons for debugging.</a:t>
+              <a:t>This project is feasible in our eyes. We must make sure to communicate well and stay on top of everything.</a:t>
             </a:r>
           </a:p>
           <a:p>
@@ -4495,7 +6138,7 @@
                   </a:schemeClr>
                 </a:solidFill>
               </a:rPr>
-              <a:t>Second revision to improve design and fly.</a:t>
+              <a:t>We have a good group that covers each other weaknesses. We have a balance between EE and CMPEN.</a:t>
             </a:r>
           </a:p>
           <a:p>
@@ -4507,7 +6150,7 @@
                   </a:schemeClr>
                 </a:solidFill>
               </a:rPr>
-              <a:t>First board Revision</a:t>
+              <a:t>Risks</a:t>
             </a:r>
           </a:p>
           <a:p>
@@ -4520,7 +6163,20 @@
                   </a:schemeClr>
                 </a:solidFill>
               </a:rPr>
-              <a:t>PCB - $4.00</a:t>
+              <a:t>Batteries</a:t>
+            </a:r>
+          </a:p>
+          <a:p>
+            <a:pPr lvl="2"/>
+            <a:r>
+              <a:rPr lang="en-US" dirty="0">
+                <a:solidFill>
+                  <a:schemeClr val="accent5">
+                    <a:lumMod val="75000"/>
+                  </a:schemeClr>
+                </a:solidFill>
+              </a:rPr>
+              <a:t>Overheating and damage to batteries can be a fire hazards.</a:t>
             </a:r>
           </a:p>
           <a:p>
@@ -4533,7 +6189,20 @@
                   </a:schemeClr>
                 </a:solidFill>
               </a:rPr>
-              <a:t>Temperature Sensor - $5.00</a:t>
+              <a:t>Over budget</a:t>
+            </a:r>
+          </a:p>
+          <a:p>
+            <a:pPr lvl="2"/>
+            <a:r>
+              <a:rPr lang="en-US" dirty="0">
+                <a:solidFill>
+                  <a:schemeClr val="accent5">
+                    <a:lumMod val="75000"/>
+                  </a:schemeClr>
+                </a:solidFill>
+              </a:rPr>
+              <a:t>Underestimating price of various components and going over asking budget.</a:t>
             </a:r>
           </a:p>
           <a:p>
@@ -4546,11 +6215,11 @@
                   </a:schemeClr>
                 </a:solidFill>
               </a:rPr>
-              <a:t>Microcontroller - $10.00</a:t>
+              <a:t>Vibration/Bad Flight</a:t>
             </a:r>
           </a:p>
           <a:p>
-            <a:pPr lvl="1"/>
+            <a:pPr lvl="2"/>
             <a:r>
               <a:rPr lang="en-US" dirty="0">
                 <a:solidFill>
@@ -4559,27 +6228,34 @@
                   </a:schemeClr>
                 </a:solidFill>
               </a:rPr>
-              <a:t>IMU - $30.00</a:t>
+              <a:t>If the rocket has a bad flight, it can rattle the electronics with vibrations.</a:t>
             </a:r>
           </a:p>
           <a:p>
-            <a:r>
-              <a:rPr lang="en-US" dirty="0">
-                <a:solidFill>
-                  <a:schemeClr val="accent5">
-                    <a:lumMod val="75000"/>
-                  </a:schemeClr>
-                </a:solidFill>
-              </a:rPr>
-              <a:t>Total for first revision: $49.00</a:t>
-            </a:r>
+            <a:pPr lvl="1"/>
+            <a:endParaRPr lang="en-US" dirty="0">
+              <a:solidFill>
+                <a:schemeClr val="accent5">
+                  <a:lumMod val="75000"/>
+                </a:schemeClr>
+              </a:solidFill>
+            </a:endParaRPr>
+          </a:p>
+          <a:p>
+            <a:endParaRPr lang="en-US" dirty="0">
+              <a:solidFill>
+                <a:schemeClr val="accent5">
+                  <a:lumMod val="75000"/>
+                </a:schemeClr>
+              </a:solidFill>
+            </a:endParaRPr>
           </a:p>
         </p:txBody>
       </p:sp>
     </p:spTree>
     <p:extLst>
       <p:ext uri="{BB962C8B-B14F-4D97-AF65-F5344CB8AC3E}">
-        <p14:creationId xmlns:p14="http://schemas.microsoft.com/office/powerpoint/2010/main" val="982414475"/>
+        <p14:creationId xmlns:p14="http://schemas.microsoft.com/office/powerpoint/2010/main" val="1862518142"/>
       </p:ext>
     </p:extLst>
   </p:cSld>
@@ -4629,7 +6305,7 @@
           <a:p>
             <a:r>
               <a:rPr lang="en-US" dirty="0"/>
-              <a:t>Feasibility Assessment/Risks</a:t>
+              <a:t>Conclusion</a:t>
             </a:r>
           </a:p>
         </p:txBody>
@@ -4663,207 +6339,6 @@
                   </a:schemeClr>
                 </a:solidFill>
               </a:rPr>
-              <a:t>Feasibility</a:t>
-            </a:r>
-          </a:p>
-          <a:p>
-            <a:pPr lvl="1"/>
-            <a:r>
-              <a:rPr lang="en-US" dirty="0">
-                <a:solidFill>
-                  <a:schemeClr val="accent5">
-                    <a:lumMod val="75000"/>
-                  </a:schemeClr>
-                </a:solidFill>
-              </a:rPr>
-              <a:t>This project is feasible in our eyes. We must make sure to communicate well and stay on top of everything</a:t>
-            </a:r>
-          </a:p>
-          <a:p>
-            <a:pPr lvl="1"/>
-            <a:r>
-              <a:rPr lang="en-US" dirty="0">
-                <a:solidFill>
-                  <a:schemeClr val="accent5">
-                    <a:lumMod val="75000"/>
-                  </a:schemeClr>
-                </a:solidFill>
-              </a:rPr>
-              <a:t>We have a good group that covers each other weaknesses.</a:t>
-            </a:r>
-          </a:p>
-          <a:p>
-            <a:r>
-              <a:rPr lang="en-US" dirty="0">
-                <a:solidFill>
-                  <a:schemeClr val="accent5">
-                    <a:lumMod val="75000"/>
-                  </a:schemeClr>
-                </a:solidFill>
-              </a:rPr>
-              <a:t>Risks</a:t>
-            </a:r>
-          </a:p>
-          <a:p>
-            <a:pPr lvl="1"/>
-            <a:r>
-              <a:rPr lang="en-US" dirty="0">
-                <a:solidFill>
-                  <a:schemeClr val="accent5">
-                    <a:lumMod val="75000"/>
-                  </a:schemeClr>
-                </a:solidFill>
-              </a:rPr>
-              <a:t>Batteries</a:t>
-            </a:r>
-          </a:p>
-          <a:p>
-            <a:pPr lvl="2"/>
-            <a:r>
-              <a:rPr lang="en-US" dirty="0">
-                <a:solidFill>
-                  <a:schemeClr val="accent5">
-                    <a:lumMod val="75000"/>
-                  </a:schemeClr>
-                </a:solidFill>
-              </a:rPr>
-              <a:t>Overheating and damage to batteries can be a fire hazards.</a:t>
-            </a:r>
-          </a:p>
-          <a:p>
-            <a:pPr lvl="1"/>
-            <a:r>
-              <a:rPr lang="en-US" dirty="0">
-                <a:solidFill>
-                  <a:schemeClr val="accent5">
-                    <a:lumMod val="75000"/>
-                  </a:schemeClr>
-                </a:solidFill>
-              </a:rPr>
-              <a:t>Over budget</a:t>
-            </a:r>
-          </a:p>
-          <a:p>
-            <a:pPr lvl="2"/>
-            <a:r>
-              <a:rPr lang="en-US" dirty="0">
-                <a:solidFill>
-                  <a:schemeClr val="accent5">
-                    <a:lumMod val="75000"/>
-                  </a:schemeClr>
-                </a:solidFill>
-              </a:rPr>
-              <a:t>Underestimating price of various components and going over asking budget.</a:t>
-            </a:r>
-          </a:p>
-          <a:p>
-            <a:pPr lvl="1"/>
-            <a:endParaRPr lang="en-US" dirty="0">
-              <a:solidFill>
-                <a:schemeClr val="accent5">
-                  <a:lumMod val="75000"/>
-                </a:schemeClr>
-              </a:solidFill>
-            </a:endParaRPr>
-          </a:p>
-          <a:p>
-            <a:endParaRPr lang="en-US" dirty="0">
-              <a:solidFill>
-                <a:schemeClr val="accent5">
-                  <a:lumMod val="75000"/>
-                </a:schemeClr>
-              </a:solidFill>
-            </a:endParaRPr>
-          </a:p>
-        </p:txBody>
-      </p:sp>
-    </p:spTree>
-    <p:extLst>
-      <p:ext uri="{BB962C8B-B14F-4D97-AF65-F5344CB8AC3E}">
-        <p14:creationId xmlns:p14="http://schemas.microsoft.com/office/powerpoint/2010/main" val="1862518142"/>
-      </p:ext>
-    </p:extLst>
-  </p:cSld>
-  <p:clrMapOvr>
-    <a:masterClrMapping/>
-  </p:clrMapOvr>
-</p:sld>
-</file>
-
-<file path=ppt/slides/slide15.xml><?xml version="1.0" encoding="utf-8"?>
-<p:sld xmlns:a="http://schemas.openxmlformats.org/drawingml/2006/main" xmlns:r="http://schemas.openxmlformats.org/officeDocument/2006/relationships" xmlns:p="http://schemas.openxmlformats.org/presentationml/2006/main">
-  <p:cSld>
-    <p:spTree>
-      <p:nvGrpSpPr>
-        <p:cNvPr id="1" name=""/>
-        <p:cNvGrpSpPr/>
-        <p:nvPr/>
-      </p:nvGrpSpPr>
-      <p:grpSpPr>
-        <a:xfrm>
-          <a:off x="0" y="0"/>
-          <a:ext cx="0" cy="0"/>
-          <a:chOff x="0" y="0"/>
-          <a:chExt cx="0" cy="0"/>
-        </a:xfrm>
-      </p:grpSpPr>
-      <p:sp>
-        <p:nvSpPr>
-          <p:cNvPr id="2" name="Title 1">
-            <a:extLst>
-              <a:ext uri="{FF2B5EF4-FFF2-40B4-BE49-F238E27FC236}">
-                <a16:creationId xmlns:a16="http://schemas.microsoft.com/office/drawing/2014/main" id="{65FEEB9D-C258-6356-E64F-0226C0C1E2D9}"/>
-              </a:ext>
-            </a:extLst>
-          </p:cNvPr>
-          <p:cNvSpPr>
-            <a:spLocks noGrp="1"/>
-          </p:cNvSpPr>
-          <p:nvPr>
-            <p:ph type="title"/>
-          </p:nvPr>
-        </p:nvSpPr>
-        <p:spPr/>
-        <p:txBody>
-          <a:bodyPr/>
-          <a:lstStyle/>
-          <a:p>
-            <a:r>
-              <a:rPr lang="en-US" dirty="0"/>
-              <a:t>Conclusion</a:t>
-            </a:r>
-          </a:p>
-        </p:txBody>
-      </p:sp>
-      <p:sp>
-        <p:nvSpPr>
-          <p:cNvPr id="3" name="Content Placeholder 2">
-            <a:extLst>
-              <a:ext uri="{FF2B5EF4-FFF2-40B4-BE49-F238E27FC236}">
-                <a16:creationId xmlns:a16="http://schemas.microsoft.com/office/drawing/2014/main" id="{8A3AF3FC-0E98-B368-78EC-704185C5ED60}"/>
-              </a:ext>
-            </a:extLst>
-          </p:cNvPr>
-          <p:cNvSpPr>
-            <a:spLocks noGrp="1"/>
-          </p:cNvSpPr>
-          <p:nvPr>
-            <p:ph idx="1"/>
-          </p:nvPr>
-        </p:nvSpPr>
-        <p:spPr/>
-        <p:txBody>
-          <a:bodyPr/>
-          <a:lstStyle/>
-          <a:p>
-            <a:r>
-              <a:rPr lang="en-US" dirty="0">
-                <a:solidFill>
-                  <a:schemeClr val="accent5">
-                    <a:lumMod val="75000"/>
-                  </a:schemeClr>
-                </a:solidFill>
-              </a:rPr>
               <a:t>Our Choice:</a:t>
             </a:r>
           </a:p>
@@ -4943,7 +6418,7 @@
 </p:sld>
 </file>
 
-<file path=ppt/slides/slide16.xml><?xml version="1.0" encoding="utf-8"?>
+<file path=ppt/slides/slide15.xml><?xml version="1.0" encoding="utf-8"?>
 <p:sld xmlns:a="http://schemas.openxmlformats.org/drawingml/2006/main" xmlns:r="http://schemas.openxmlformats.org/officeDocument/2006/relationships" xmlns:p="http://schemas.openxmlformats.org/presentationml/2006/main">
   <p:cSld>
     <p:bg>
@@ -5762,7 +7237,7 @@
           <a:p>
             <a:r>
               <a:rPr lang="en-US" dirty="0"/>
-              <a:t>Purpose and Objective ?</a:t>
+              <a:t>Purpose and Objective</a:t>
             </a:r>
           </a:p>
         </p:txBody>
@@ -14867,7 +16342,331 @@
 </a:theme>
 </file>
 
+<file path=ppt/theme/theme2.xml><?xml version="1.0" encoding="utf-8"?>
+<a:theme xmlns:a="http://schemas.openxmlformats.org/drawingml/2006/main" name="Office Theme">
+  <a:themeElements>
+    <a:clrScheme name="Office">
+      <a:dk1>
+        <a:sysClr val="windowText" lastClr="000000"/>
+      </a:dk1>
+      <a:lt1>
+        <a:sysClr val="window" lastClr="FFFFFF"/>
+      </a:lt1>
+      <a:dk2>
+        <a:srgbClr val="0E2841"/>
+      </a:dk2>
+      <a:lt2>
+        <a:srgbClr val="E8E8E8"/>
+      </a:lt2>
+      <a:accent1>
+        <a:srgbClr val="156082"/>
+      </a:accent1>
+      <a:accent2>
+        <a:srgbClr val="E97132"/>
+      </a:accent2>
+      <a:accent3>
+        <a:srgbClr val="196B24"/>
+      </a:accent3>
+      <a:accent4>
+        <a:srgbClr val="0F9ED5"/>
+      </a:accent4>
+      <a:accent5>
+        <a:srgbClr val="A02B93"/>
+      </a:accent5>
+      <a:accent6>
+        <a:srgbClr val="4EA72E"/>
+      </a:accent6>
+      <a:hlink>
+        <a:srgbClr val="467886"/>
+      </a:hlink>
+      <a:folHlink>
+        <a:srgbClr val="96607D"/>
+      </a:folHlink>
+    </a:clrScheme>
+    <a:fontScheme name="Office">
+      <a:majorFont>
+        <a:latin typeface="Aptos Display" panose="02110004020202020204"/>
+        <a:ea typeface=""/>
+        <a:cs typeface=""/>
+        <a:font script="Jpan" typeface="游ゴシック Light"/>
+        <a:font script="Hang" typeface="맑은 고딕"/>
+        <a:font script="Hans" typeface="等线 Light"/>
+        <a:font script="Hant" typeface="新細明體"/>
+        <a:font script="Arab" typeface="Times New Roman"/>
+        <a:font script="Hebr" typeface="Times New Roman"/>
+        <a:font script="Thai" typeface="Angsana New"/>
+        <a:font script="Ethi" typeface="Nyala"/>
+        <a:font script="Beng" typeface="Vrinda"/>
+        <a:font script="Gujr" typeface="Shruti"/>
+        <a:font script="Khmr" typeface="MoolBoran"/>
+        <a:font script="Knda" typeface="Tunga"/>
+        <a:font script="Guru" typeface="Raavi"/>
+        <a:font script="Cans" typeface="Euphemia"/>
+        <a:font script="Cher" typeface="Plantagenet Cherokee"/>
+        <a:font script="Yiii" typeface="Microsoft Yi Baiti"/>
+        <a:font script="Tibt" typeface="Microsoft Himalaya"/>
+        <a:font script="Thaa" typeface="MV Boli"/>
+        <a:font script="Deva" typeface="Mangal"/>
+        <a:font script="Telu" typeface="Gautami"/>
+        <a:font script="Taml" typeface="Latha"/>
+        <a:font script="Syrc" typeface="Estrangelo Edessa"/>
+        <a:font script="Orya" typeface="Kalinga"/>
+        <a:font script="Mlym" typeface="Kartika"/>
+        <a:font script="Laoo" typeface="DokChampa"/>
+        <a:font script="Sinh" typeface="Iskoola Pota"/>
+        <a:font script="Mong" typeface="Mongolian Baiti"/>
+        <a:font script="Viet" typeface="Times New Roman"/>
+        <a:font script="Uigh" typeface="Microsoft Uighur"/>
+        <a:font script="Geor" typeface="Sylfaen"/>
+        <a:font script="Armn" typeface="Arial"/>
+        <a:font script="Bugi" typeface="Leelawadee UI"/>
+        <a:font script="Bopo" typeface="Microsoft JhengHei"/>
+        <a:font script="Java" typeface="Javanese Text"/>
+        <a:font script="Lisu" typeface="Segoe UI"/>
+        <a:font script="Mymr" typeface="Myanmar Text"/>
+        <a:font script="Nkoo" typeface="Ebrima"/>
+        <a:font script="Olck" typeface="Nirmala UI"/>
+        <a:font script="Osma" typeface="Ebrima"/>
+        <a:font script="Phag" typeface="Phagspa"/>
+        <a:font script="Syrn" typeface="Estrangelo Edessa"/>
+        <a:font script="Syrj" typeface="Estrangelo Edessa"/>
+        <a:font script="Syre" typeface="Estrangelo Edessa"/>
+        <a:font script="Sora" typeface="Nirmala UI"/>
+        <a:font script="Tale" typeface="Microsoft Tai Le"/>
+        <a:font script="Talu" typeface="Microsoft New Tai Lue"/>
+        <a:font script="Tfng" typeface="Ebrima"/>
+      </a:majorFont>
+      <a:minorFont>
+        <a:latin typeface="Aptos" panose="02110004020202020204"/>
+        <a:ea typeface=""/>
+        <a:cs typeface=""/>
+        <a:font script="Jpan" typeface="游ゴシック"/>
+        <a:font script="Hang" typeface="맑은 고딕"/>
+        <a:font script="Hans" typeface="等线"/>
+        <a:font script="Hant" typeface="新細明體"/>
+        <a:font script="Arab" typeface="Arial"/>
+        <a:font script="Hebr" typeface="Arial"/>
+        <a:font script="Thai" typeface="Cordia New"/>
+        <a:font script="Ethi" typeface="Nyala"/>
+        <a:font script="Beng" typeface="Vrinda"/>
+        <a:font script="Gujr" typeface="Shruti"/>
+        <a:font script="Khmr" typeface="DaunPenh"/>
+        <a:font script="Knda" typeface="Tunga"/>
+        <a:font script="Guru" typeface="Raavi"/>
+        <a:font script="Cans" typeface="Euphemia"/>
+        <a:font script="Cher" typeface="Plantagenet Cherokee"/>
+        <a:font script="Yiii" typeface="Microsoft Yi Baiti"/>
+        <a:font script="Tibt" typeface="Microsoft Himalaya"/>
+        <a:font script="Thaa" typeface="MV Boli"/>
+        <a:font script="Deva" typeface="Mangal"/>
+        <a:font script="Telu" typeface="Gautami"/>
+        <a:font script="Taml" typeface="Latha"/>
+        <a:font script="Syrc" typeface="Estrangelo Edessa"/>
+        <a:font script="Orya" typeface="Kalinga"/>
+        <a:font script="Mlym" typeface="Kartika"/>
+        <a:font script="Laoo" typeface="DokChampa"/>
+        <a:font script="Sinh" typeface="Iskoola Pota"/>
+        <a:font script="Mong" typeface="Mongolian Baiti"/>
+        <a:font script="Viet" typeface="Arial"/>
+        <a:font script="Uigh" typeface="Microsoft Uighur"/>
+        <a:font script="Geor" typeface="Sylfaen"/>
+        <a:font script="Armn" typeface="Arial"/>
+        <a:font script="Bugi" typeface="Leelawadee UI"/>
+        <a:font script="Bopo" typeface="Microsoft JhengHei"/>
+        <a:font script="Java" typeface="Javanese Text"/>
+        <a:font script="Lisu" typeface="Segoe UI"/>
+        <a:font script="Mymr" typeface="Myanmar Text"/>
+        <a:font script="Nkoo" typeface="Ebrima"/>
+        <a:font script="Olck" typeface="Nirmala UI"/>
+        <a:font script="Osma" typeface="Ebrima"/>
+        <a:font script="Phag" typeface="Phagspa"/>
+        <a:font script="Syrn" typeface="Estrangelo Edessa"/>
+        <a:font script="Syrj" typeface="Estrangelo Edessa"/>
+        <a:font script="Syre" typeface="Estrangelo Edessa"/>
+        <a:font script="Sora" typeface="Nirmala UI"/>
+        <a:font script="Tale" typeface="Microsoft Tai Le"/>
+        <a:font script="Talu" typeface="Microsoft New Tai Lue"/>
+        <a:font script="Tfng" typeface="Ebrima"/>
+      </a:minorFont>
+    </a:fontScheme>
+    <a:fmtScheme name="Office">
+      <a:fillStyleLst>
+        <a:solidFill>
+          <a:schemeClr val="phClr"/>
+        </a:solidFill>
+        <a:gradFill rotWithShape="1">
+          <a:gsLst>
+            <a:gs pos="0">
+              <a:schemeClr val="phClr">
+                <a:lumMod val="110000"/>
+                <a:satMod val="105000"/>
+                <a:tint val="67000"/>
+              </a:schemeClr>
+            </a:gs>
+            <a:gs pos="50000">
+              <a:schemeClr val="phClr">
+                <a:lumMod val="105000"/>
+                <a:satMod val="103000"/>
+                <a:tint val="73000"/>
+              </a:schemeClr>
+            </a:gs>
+            <a:gs pos="100000">
+              <a:schemeClr val="phClr">
+                <a:lumMod val="105000"/>
+                <a:satMod val="109000"/>
+                <a:tint val="81000"/>
+              </a:schemeClr>
+            </a:gs>
+          </a:gsLst>
+          <a:lin ang="5400000" scaled="0"/>
+        </a:gradFill>
+        <a:gradFill rotWithShape="1">
+          <a:gsLst>
+            <a:gs pos="0">
+              <a:schemeClr val="phClr">
+                <a:satMod val="103000"/>
+                <a:lumMod val="102000"/>
+                <a:tint val="94000"/>
+              </a:schemeClr>
+            </a:gs>
+            <a:gs pos="50000">
+              <a:schemeClr val="phClr">
+                <a:satMod val="110000"/>
+                <a:lumMod val="100000"/>
+                <a:shade val="100000"/>
+              </a:schemeClr>
+            </a:gs>
+            <a:gs pos="100000">
+              <a:schemeClr val="phClr">
+                <a:lumMod val="99000"/>
+                <a:satMod val="120000"/>
+                <a:shade val="78000"/>
+              </a:schemeClr>
+            </a:gs>
+          </a:gsLst>
+          <a:lin ang="5400000" scaled="0"/>
+        </a:gradFill>
+      </a:fillStyleLst>
+      <a:lnStyleLst>
+        <a:ln w="12700" cap="flat" cmpd="sng" algn="ctr">
+          <a:solidFill>
+            <a:schemeClr val="phClr"/>
+          </a:solidFill>
+          <a:prstDash val="solid"/>
+          <a:miter lim="800000"/>
+        </a:ln>
+        <a:ln w="19050" cap="flat" cmpd="sng" algn="ctr">
+          <a:solidFill>
+            <a:schemeClr val="phClr"/>
+          </a:solidFill>
+          <a:prstDash val="solid"/>
+          <a:miter lim="800000"/>
+        </a:ln>
+        <a:ln w="25400" cap="flat" cmpd="sng" algn="ctr">
+          <a:solidFill>
+            <a:schemeClr val="phClr"/>
+          </a:solidFill>
+          <a:prstDash val="solid"/>
+          <a:miter lim="800000"/>
+        </a:ln>
+      </a:lnStyleLst>
+      <a:effectStyleLst>
+        <a:effectStyle>
+          <a:effectLst/>
+        </a:effectStyle>
+        <a:effectStyle>
+          <a:effectLst/>
+        </a:effectStyle>
+        <a:effectStyle>
+          <a:effectLst>
+            <a:outerShdw blurRad="57150" dist="19050" dir="5400000" algn="ctr" rotWithShape="0">
+              <a:srgbClr val="000000">
+                <a:alpha val="63000"/>
+              </a:srgbClr>
+            </a:outerShdw>
+          </a:effectLst>
+        </a:effectStyle>
+      </a:effectStyleLst>
+      <a:bgFillStyleLst>
+        <a:solidFill>
+          <a:schemeClr val="phClr"/>
+        </a:solidFill>
+        <a:solidFill>
+          <a:schemeClr val="phClr">
+            <a:tint val="95000"/>
+            <a:satMod val="170000"/>
+          </a:schemeClr>
+        </a:solidFill>
+        <a:gradFill rotWithShape="1">
+          <a:gsLst>
+            <a:gs pos="0">
+              <a:schemeClr val="phClr">
+                <a:tint val="93000"/>
+                <a:satMod val="150000"/>
+                <a:shade val="98000"/>
+                <a:lumMod val="102000"/>
+              </a:schemeClr>
+            </a:gs>
+            <a:gs pos="50000">
+              <a:schemeClr val="phClr">
+                <a:tint val="98000"/>
+                <a:satMod val="130000"/>
+                <a:shade val="90000"/>
+                <a:lumMod val="103000"/>
+              </a:schemeClr>
+            </a:gs>
+            <a:gs pos="100000">
+              <a:schemeClr val="phClr">
+                <a:shade val="63000"/>
+                <a:satMod val="120000"/>
+              </a:schemeClr>
+            </a:gs>
+          </a:gsLst>
+          <a:lin ang="5400000" scaled="0"/>
+        </a:gradFill>
+      </a:bgFillStyleLst>
+    </a:fmtScheme>
+  </a:themeElements>
+  <a:objectDefaults>
+    <a:lnDef>
+      <a:spPr/>
+      <a:bodyPr/>
+      <a:lstStyle/>
+      <a:style>
+        <a:lnRef idx="2">
+          <a:schemeClr val="accent1"/>
+        </a:lnRef>
+        <a:fillRef idx="0">
+          <a:schemeClr val="accent1"/>
+        </a:fillRef>
+        <a:effectRef idx="1">
+          <a:schemeClr val="accent1"/>
+        </a:effectRef>
+        <a:fontRef idx="minor">
+          <a:schemeClr val="tx1"/>
+        </a:fontRef>
+      </a:style>
+    </a:lnDef>
+  </a:objectDefaults>
+  <a:extraClrSchemeLst/>
+  <a:extLst>
+    <a:ext uri="{05A4C25C-085E-4340-85A3-A5531E510DB2}">
+      <thm15:themeFamily xmlns:thm15="http://schemas.microsoft.com/office/thememl/2012/main" name="Office Theme" id="{2E142A2C-CD16-42D6-873A-C26D2A0506FA}" vid="{1BDDFF52-6CD6-40A5-AB3C-68EB2F1E4D0A}"/>
+    </a:ext>
+  </a:extLst>
+</a:theme>
+</file>
+
 <file path=customXml/item1.xml><?xml version="1.0" encoding="utf-8"?>
+<?mso-contentType ?>
+<FormTemplates xmlns="http://schemas.microsoft.com/sharepoint/v3/contenttype/forms">
+  <Display>DocumentLibraryForm</Display>
+  <Edit>DocumentLibraryForm</Edit>
+  <New>DocumentLibraryForm</New>
+</FormTemplates>
+</file>
+
+<file path=customXml/item2.xml><?xml version="1.0" encoding="utf-8"?>
 <ct:contentTypeSchema xmlns:ct="http://schemas.microsoft.com/office/2006/metadata/contentType" xmlns:ma="http://schemas.microsoft.com/office/2006/metadata/properties/metaAttributes" ct:_="" ma:_="" ma:contentTypeName="Document" ma:contentTypeID="0x0101009ADC84C2C2689F418E5BAD3CA70F51C1" ma:contentTypeVersion="15" ma:contentTypeDescription="Create a new document." ma:contentTypeScope="" ma:versionID="dfa36a507fa972b0dae0ef5557aeb3eb">
   <xsd:schema xmlns:xsd="http://www.w3.org/2001/XMLSchema" xmlns:xs="http://www.w3.org/2001/XMLSchema" xmlns:p="http://schemas.microsoft.com/office/2006/metadata/properties" xmlns:ns3="218cae68-0ddc-43bb-9a29-52a0402d6cb9" xmlns:ns4="703aeb73-56ce-48f3-9277-f60cff690132" targetNamespace="http://schemas.microsoft.com/office/2006/metadata/properties" ma:root="true" ma:fieldsID="cb78c5b39430d5080de0e1d97c12cd45" ns3:_="" ns4:_="">
     <xsd:import namespace="218cae68-0ddc-43bb-9a29-52a0402d6cb9"/>
@@ -15100,15 +16899,6 @@
 </ct:contentTypeSchema>
 </file>
 
-<file path=customXml/item2.xml><?xml version="1.0" encoding="utf-8"?>
-<?mso-contentType ?>
-<FormTemplates xmlns="http://schemas.microsoft.com/sharepoint/v3/contenttype/forms">
-  <Display>DocumentLibraryForm</Display>
-  <Edit>DocumentLibraryForm</Edit>
-  <New>DocumentLibraryForm</New>
-</FormTemplates>
-</file>
-
 <file path=customXml/item3.xml><?xml version="1.0" encoding="utf-8"?>
 <p:properties xmlns:p="http://schemas.microsoft.com/office/2006/metadata/properties" xmlns:xsi="http://www.w3.org/2001/XMLSchema-instance" xmlns:pc="http://schemas.microsoft.com/office/infopath/2007/PartnerControls">
   <documentManagement>
@@ -15118,6 +16908,14 @@
 </file>
 
 <file path=customXml/itemProps1.xml><?xml version="1.0" encoding="utf-8"?>
+<ds:datastoreItem xmlns:ds="http://schemas.openxmlformats.org/officeDocument/2006/customXml" ds:itemID="{3A69843A-82BD-41BC-9CFD-7A6BCBCF50D4}">
+  <ds:schemaRefs>
+    <ds:schemaRef ds:uri="http://schemas.microsoft.com/sharepoint/v3/contenttype/forms"/>
+  </ds:schemaRefs>
+</ds:datastoreItem>
+</file>
+
+<file path=customXml/itemProps2.xml><?xml version="1.0" encoding="utf-8"?>
 <ds:datastoreItem xmlns:ds="http://schemas.openxmlformats.org/officeDocument/2006/customXml" ds:itemID="{0058B037-F10E-47D7-816C-415ABC0EB55F}">
   <ds:schemaRefs>
     <ds:schemaRef ds:uri="http://schemas.microsoft.com/office/2006/metadata/contentType"/>
@@ -15132,14 +16930,6 @@
     <ds:schemaRef ds:uri="http://purl.org/dc/elements/1.1/"/>
     <ds:schemaRef ds:uri="http://purl.org/dc/terms/"/>
     <ds:schemaRef ds:uri="http://schemas.microsoft.com/internal/obd"/>
-  </ds:schemaRefs>
-</ds:datastoreItem>
-</file>
-
-<file path=customXml/itemProps2.xml><?xml version="1.0" encoding="utf-8"?>
-<ds:datastoreItem xmlns:ds="http://schemas.openxmlformats.org/officeDocument/2006/customXml" ds:itemID="{3A69843A-82BD-41BC-9CFD-7A6BCBCF50D4}">
-  <ds:schemaRefs>
-    <ds:schemaRef ds:uri="http://schemas.microsoft.com/sharepoint/v3/contenttype/forms"/>
   </ds:schemaRefs>
 </ds:datastoreItem>
 </file>

</xml_diff>